<commit_message>
Modify ppt presentation for redefense
</commit_message>
<xml_diff>
--- a/Documentation/For Finals/CSPROJ_FinalPresentation_Edited.pptx
+++ b/Documentation/For Finals/CSPROJ_FinalPresentation_Edited.pptx
@@ -5,7 +5,7 @@
     <p:sldMasterId id="2147483696" r:id="rId1"/>
   </p:sldMasterIdLst>
   <p:notesMasterIdLst>
-    <p:notesMasterId r:id="rId17"/>
+    <p:notesMasterId r:id="rId19"/>
   </p:notesMasterIdLst>
   <p:sldIdLst>
     <p:sldId id="256" r:id="rId2"/>
@@ -19,10 +19,12 @@
     <p:sldId id="263" r:id="rId10"/>
     <p:sldId id="264" r:id="rId11"/>
     <p:sldId id="270" r:id="rId12"/>
-    <p:sldId id="265" r:id="rId13"/>
-    <p:sldId id="266" r:id="rId14"/>
-    <p:sldId id="269" r:id="rId15"/>
-    <p:sldId id="267" r:id="rId16"/>
+    <p:sldId id="273" r:id="rId13"/>
+    <p:sldId id="272" r:id="rId14"/>
+    <p:sldId id="265" r:id="rId15"/>
+    <p:sldId id="266" r:id="rId16"/>
+    <p:sldId id="269" r:id="rId17"/>
+    <p:sldId id="267" r:id="rId18"/>
   </p:sldIdLst>
   <p:sldSz cx="12192000" cy="6858000"/>
   <p:notesSz cx="6858000" cy="9144000"/>
@@ -2875,7 +2877,7 @@
           <a:p>
             <a:fld id="{9622FBBB-3935-434B-BC46-B788F489023C}" type="datetimeFigureOut">
               <a:rPr lang="en-PH" smtClean="0"/>
-              <a:t>02/01/2018</a:t>
+              <a:t>04/01/2018</a:t>
             </a:fld>
             <a:endParaRPr lang="en-PH"/>
           </a:p>
@@ -3439,7 +3441,7 @@
           <a:bodyPr/>
           <a:lstStyle/>
           <a:p>
-            <a:endParaRPr lang="en-PH"/>
+            <a:endParaRPr lang="en-PH" dirty="0"/>
           </a:p>
         </p:txBody>
       </p:sp>
@@ -3469,7 +3471,7 @@
     </p:spTree>
     <p:extLst>
       <p:ext uri="{BB962C8B-B14F-4D97-AF65-F5344CB8AC3E}">
-        <p14:creationId xmlns:p14="http://schemas.microsoft.com/office/powerpoint/2010/main" val="2736209310"/>
+        <p14:creationId xmlns:p14="http://schemas.microsoft.com/office/powerpoint/2010/main" val="3050293627"/>
       </p:ext>
     </p:extLst>
   </p:cSld>
@@ -3523,7 +3525,7 @@
           <a:bodyPr/>
           <a:lstStyle/>
           <a:p>
-            <a:endParaRPr lang="en-PH"/>
+            <a:endParaRPr lang="en-PH" dirty="0"/>
           </a:p>
         </p:txBody>
       </p:sp>
@@ -3553,7 +3555,7 @@
     </p:spTree>
     <p:extLst>
       <p:ext uri="{BB962C8B-B14F-4D97-AF65-F5344CB8AC3E}">
-        <p14:creationId xmlns:p14="http://schemas.microsoft.com/office/powerpoint/2010/main" val="3599180905"/>
+        <p14:creationId xmlns:p14="http://schemas.microsoft.com/office/powerpoint/2010/main" val="459366449"/>
       </p:ext>
     </p:extLst>
   </p:cSld>
@@ -3607,39 +3609,7 @@
           <a:bodyPr/>
           <a:lstStyle/>
           <a:p>
-            <a:r>
-              <a:rPr lang="en-PH" dirty="0"/>
-              <a:t>Service request and report system is responsible for monitoring the service tickets and transform it into an escalated ticket. However,  this process cannot be done without an unattended service ticket. </a:t>
-            </a:r>
-            <a:br>
-              <a:rPr lang="en-PH" dirty="0"/>
-            </a:br>
-            <a:endParaRPr lang="en-PH" dirty="0"/>
-          </a:p>
-          <a:p>
-            <a:r>
-              <a:rPr lang="en-PH" dirty="0"/>
-              <a:t>Once the unattended service ticket became an escalated ticket, the escalation management module notifies the Level 1 senior employee which is the Supervisor – the supervisor must update the escalated ticket status for it to considered by the module as an In-progress ticket and also to activate the timer. If the Supervisor failed to close the ticket and exceeds by the given time, it automatically notifies and re-assign the ticket to the next level of senior employee which is the Department Manager. </a:t>
-            </a:r>
-            <a:br>
-              <a:rPr lang="en-PH" dirty="0"/>
-            </a:br>
-            <a:br>
-              <a:rPr lang="en-PH" dirty="0"/>
-            </a:br>
-            <a:r>
-              <a:rPr lang="en-PH" dirty="0"/>
-              <a:t>Previous owners of the ticket must enter an escalated ticket’s reason.</a:t>
-            </a:r>
-          </a:p>
-          <a:p>
-            <a:endParaRPr lang="en-PH" dirty="0"/>
-          </a:p>
-          <a:p>
-            <a:r>
-              <a:rPr lang="en-PH"/>
-              <a:t>Once the tickets closed, the module sends an update of escalated ticket details to the Service Request and Report System and generates an escalation report which displays a graphical representation of how many times a certain nature of service were escalated.   </a:t>
-            </a:r>
+            <a:endParaRPr lang="en-PH"/>
           </a:p>
         </p:txBody>
       </p:sp>
@@ -3669,7 +3639,7 @@
     </p:spTree>
     <p:extLst>
       <p:ext uri="{BB962C8B-B14F-4D97-AF65-F5344CB8AC3E}">
-        <p14:creationId xmlns:p14="http://schemas.microsoft.com/office/powerpoint/2010/main" val="4204218817"/>
+        <p14:creationId xmlns:p14="http://schemas.microsoft.com/office/powerpoint/2010/main" val="2736209310"/>
       </p:ext>
     </p:extLst>
   </p:cSld>
@@ -3745,6 +3715,206 @@
             <a:fld id="{B788C609-FAFD-46ED-839A-3096354BE885}" type="slidenum">
               <a:rPr lang="en-PH" smtClean="0"/>
               <a:t>15</a:t>
+            </a:fld>
+            <a:endParaRPr lang="en-PH"/>
+          </a:p>
+        </p:txBody>
+      </p:sp>
+    </p:spTree>
+    <p:extLst>
+      <p:ext uri="{BB962C8B-B14F-4D97-AF65-F5344CB8AC3E}">
+        <p14:creationId xmlns:p14="http://schemas.microsoft.com/office/powerpoint/2010/main" val="3599180905"/>
+      </p:ext>
+    </p:extLst>
+  </p:cSld>
+  <p:clrMapOvr>
+    <a:masterClrMapping/>
+  </p:clrMapOvr>
+</p:notes>
+</file>
+
+<file path=ppt/notesSlides/notesSlide16.xml><?xml version="1.0" encoding="utf-8"?>
+<p:notes xmlns:a="http://schemas.openxmlformats.org/drawingml/2006/main" xmlns:r="http://schemas.openxmlformats.org/officeDocument/2006/relationships" xmlns:p="http://schemas.openxmlformats.org/presentationml/2006/main">
+  <p:cSld>
+    <p:spTree>
+      <p:nvGrpSpPr>
+        <p:cNvPr id="1" name=""/>
+        <p:cNvGrpSpPr/>
+        <p:nvPr/>
+      </p:nvGrpSpPr>
+      <p:grpSpPr>
+        <a:xfrm>
+          <a:off x="0" y="0"/>
+          <a:ext cx="0" cy="0"/>
+          <a:chOff x="0" y="0"/>
+          <a:chExt cx="0" cy="0"/>
+        </a:xfrm>
+      </p:grpSpPr>
+      <p:sp>
+        <p:nvSpPr>
+          <p:cNvPr id="2" name="Slide Image Placeholder 1"/>
+          <p:cNvSpPr>
+            <a:spLocks noGrp="1" noRot="1" noChangeAspect="1"/>
+          </p:cNvSpPr>
+          <p:nvPr>
+            <p:ph type="sldImg"/>
+          </p:nvPr>
+        </p:nvSpPr>
+        <p:spPr/>
+      </p:sp>
+      <p:sp>
+        <p:nvSpPr>
+          <p:cNvPr id="3" name="Notes Placeholder 2"/>
+          <p:cNvSpPr>
+            <a:spLocks noGrp="1"/>
+          </p:cNvSpPr>
+          <p:nvPr>
+            <p:ph type="body" idx="1"/>
+          </p:nvPr>
+        </p:nvSpPr>
+        <p:spPr/>
+        <p:txBody>
+          <a:bodyPr/>
+          <a:lstStyle/>
+          <a:p>
+            <a:r>
+              <a:rPr lang="en-PH" dirty="0"/>
+              <a:t>Service request and report system is responsible for monitoring the service tickets and transform it into an escalated ticket. However,  this process cannot be done without an unattended service ticket. </a:t>
+            </a:r>
+            <a:br>
+              <a:rPr lang="en-PH" dirty="0"/>
+            </a:br>
+            <a:endParaRPr lang="en-PH" dirty="0"/>
+          </a:p>
+          <a:p>
+            <a:r>
+              <a:rPr lang="en-PH" dirty="0"/>
+              <a:t>Once the unattended service ticket became an escalated ticket, the escalation management module notifies the Level 1 senior employee which is the Supervisor – the supervisor must update the escalated ticket status for it to considered by the module as an In-progress ticket and also to activate the timer. If the Supervisor failed to close the ticket and exceeds by the given time, it automatically notifies and re-assign the ticket to the next level of senior employee which is the Department Manager. </a:t>
+            </a:r>
+            <a:br>
+              <a:rPr lang="en-PH" dirty="0"/>
+            </a:br>
+            <a:br>
+              <a:rPr lang="en-PH" dirty="0"/>
+            </a:br>
+            <a:r>
+              <a:rPr lang="en-PH" dirty="0"/>
+              <a:t>Previous owners of the ticket must enter an escalated ticket’s reason.</a:t>
+            </a:r>
+          </a:p>
+          <a:p>
+            <a:endParaRPr lang="en-PH" dirty="0"/>
+          </a:p>
+          <a:p>
+            <a:r>
+              <a:rPr lang="en-PH"/>
+              <a:t>Once the tickets closed, the module sends an update of escalated ticket details to the Service Request and Report System and generates an escalation report which displays a graphical representation of how many times a certain nature of service were escalated.   </a:t>
+            </a:r>
+          </a:p>
+        </p:txBody>
+      </p:sp>
+      <p:sp>
+        <p:nvSpPr>
+          <p:cNvPr id="4" name="Slide Number Placeholder 3"/>
+          <p:cNvSpPr>
+            <a:spLocks noGrp="1"/>
+          </p:cNvSpPr>
+          <p:nvPr>
+            <p:ph type="sldNum" sz="quarter" idx="10"/>
+          </p:nvPr>
+        </p:nvSpPr>
+        <p:spPr/>
+        <p:txBody>
+          <a:bodyPr/>
+          <a:lstStyle/>
+          <a:p>
+            <a:fld id="{B788C609-FAFD-46ED-839A-3096354BE885}" type="slidenum">
+              <a:rPr lang="en-PH" smtClean="0"/>
+              <a:t>16</a:t>
+            </a:fld>
+            <a:endParaRPr lang="en-PH"/>
+          </a:p>
+        </p:txBody>
+      </p:sp>
+    </p:spTree>
+    <p:extLst>
+      <p:ext uri="{BB962C8B-B14F-4D97-AF65-F5344CB8AC3E}">
+        <p14:creationId xmlns:p14="http://schemas.microsoft.com/office/powerpoint/2010/main" val="4204218817"/>
+      </p:ext>
+    </p:extLst>
+  </p:cSld>
+  <p:clrMapOvr>
+    <a:masterClrMapping/>
+  </p:clrMapOvr>
+</p:notes>
+</file>
+
+<file path=ppt/notesSlides/notesSlide17.xml><?xml version="1.0" encoding="utf-8"?>
+<p:notes xmlns:a="http://schemas.openxmlformats.org/drawingml/2006/main" xmlns:r="http://schemas.openxmlformats.org/officeDocument/2006/relationships" xmlns:p="http://schemas.openxmlformats.org/presentationml/2006/main">
+  <p:cSld>
+    <p:spTree>
+      <p:nvGrpSpPr>
+        <p:cNvPr id="1" name=""/>
+        <p:cNvGrpSpPr/>
+        <p:nvPr/>
+      </p:nvGrpSpPr>
+      <p:grpSpPr>
+        <a:xfrm>
+          <a:off x="0" y="0"/>
+          <a:ext cx="0" cy="0"/>
+          <a:chOff x="0" y="0"/>
+          <a:chExt cx="0" cy="0"/>
+        </a:xfrm>
+      </p:grpSpPr>
+      <p:sp>
+        <p:nvSpPr>
+          <p:cNvPr id="2" name="Slide Image Placeholder 1"/>
+          <p:cNvSpPr>
+            <a:spLocks noGrp="1" noRot="1" noChangeAspect="1"/>
+          </p:cNvSpPr>
+          <p:nvPr>
+            <p:ph type="sldImg"/>
+          </p:nvPr>
+        </p:nvSpPr>
+        <p:spPr/>
+      </p:sp>
+      <p:sp>
+        <p:nvSpPr>
+          <p:cNvPr id="3" name="Notes Placeholder 2"/>
+          <p:cNvSpPr>
+            <a:spLocks noGrp="1"/>
+          </p:cNvSpPr>
+          <p:nvPr>
+            <p:ph type="body" idx="1"/>
+          </p:nvPr>
+        </p:nvSpPr>
+        <p:spPr/>
+        <p:txBody>
+          <a:bodyPr/>
+          <a:lstStyle/>
+          <a:p>
+            <a:endParaRPr lang="en-PH"/>
+          </a:p>
+        </p:txBody>
+      </p:sp>
+      <p:sp>
+        <p:nvSpPr>
+          <p:cNvPr id="4" name="Slide Number Placeholder 3"/>
+          <p:cNvSpPr>
+            <a:spLocks noGrp="1"/>
+          </p:cNvSpPr>
+          <p:nvPr>
+            <p:ph type="sldNum" sz="quarter" idx="10"/>
+          </p:nvPr>
+        </p:nvSpPr>
+        <p:spPr/>
+        <p:txBody>
+          <a:bodyPr/>
+          <a:lstStyle/>
+          <a:p>
+            <a:fld id="{B788C609-FAFD-46ED-839A-3096354BE885}" type="slidenum">
+              <a:rPr lang="en-PH" smtClean="0"/>
+              <a:t>17</a:t>
             </a:fld>
             <a:endParaRPr lang="en-PH"/>
           </a:p>
@@ -4598,7 +4768,7 @@
           <a:p>
             <a:fld id="{1160EA64-D806-43AC-9DF2-F8C432F32B4C}" type="datetimeFigureOut">
               <a:rPr lang="en-US" dirty="0"/>
-              <a:t>1/2/2018</a:t>
+              <a:t>1/4/2018</a:t>
             </a:fld>
             <a:endParaRPr lang="en-US" dirty="0"/>
           </a:p>
@@ -4764,7 +4934,7 @@
           <a:p>
             <a:fld id="{E9F9C37B-1D36-470B-8223-D6C91242EC14}" type="datetimeFigureOut">
               <a:rPr lang="en-US" dirty="0"/>
-              <a:t>1/2/2018</a:t>
+              <a:t>1/4/2018</a:t>
             </a:fld>
             <a:endParaRPr lang="en-US" dirty="0"/>
           </a:p>
@@ -4939,7 +5109,7 @@
           <a:p>
             <a:fld id="{67C6F52A-A82B-47A2-A83A-8C4C91F2D59F}" type="datetimeFigureOut">
               <a:rPr lang="en-US" dirty="0"/>
-              <a:t>1/2/2018</a:t>
+              <a:t>1/4/2018</a:t>
             </a:fld>
             <a:endParaRPr lang="en-US" dirty="0"/>
           </a:p>
@@ -5104,7 +5274,7 @@
           <a:p>
             <a:fld id="{F070A7B3-6521-4DCA-87E5-044747A908C1}" type="datetimeFigureOut">
               <a:rPr lang="en-US" dirty="0"/>
-              <a:t>1/2/2018</a:t>
+              <a:t>1/4/2018</a:t>
             </a:fld>
             <a:endParaRPr lang="en-US" dirty="0"/>
           </a:p>
@@ -5368,7 +5538,7 @@
           <a:p>
             <a:fld id="{1160EA64-D806-43AC-9DF2-F8C432F32B4C}" type="datetimeFigureOut">
               <a:rPr lang="en-US" dirty="0"/>
-              <a:t>1/2/2018</a:t>
+              <a:t>1/4/2018</a:t>
             </a:fld>
             <a:endParaRPr lang="en-US" dirty="0"/>
           </a:p>
@@ -5596,7 +5766,7 @@
           <a:p>
             <a:fld id="{AB134690-1557-4C89-A502-4959FE7FAD70}" type="datetimeFigureOut">
               <a:rPr lang="en-US" dirty="0"/>
-              <a:t>1/2/2018</a:t>
+              <a:t>1/4/2018</a:t>
             </a:fld>
             <a:endParaRPr lang="en-US" dirty="0"/>
           </a:p>
@@ -5946,7 +6116,7 @@
           <a:p>
             <a:fld id="{4F7D4976-E339-4826-83B7-FBD03F55ECF8}" type="datetimeFigureOut">
               <a:rPr lang="en-US" dirty="0"/>
-              <a:t>1/2/2018</a:t>
+              <a:t>1/4/2018</a:t>
             </a:fld>
             <a:endParaRPr lang="en-US" dirty="0"/>
           </a:p>
@@ -6082,7 +6252,7 @@
           <a:p>
             <a:fld id="{E1037C31-9E7A-4F99-8774-A0E530DE1A42}" type="datetimeFigureOut">
               <a:rPr lang="en-US" dirty="0"/>
-              <a:t>1/2/2018</a:t>
+              <a:t>1/4/2018</a:t>
             </a:fld>
             <a:endParaRPr lang="en-US" dirty="0"/>
           </a:p>
@@ -6172,7 +6342,7 @@
           <a:p>
             <a:fld id="{C278504F-A551-4DE0-9316-4DCD1D8CC752}" type="datetimeFigureOut">
               <a:rPr lang="en-US" dirty="0"/>
-              <a:t>1/2/2018</a:t>
+              <a:t>1/4/2018</a:t>
             </a:fld>
             <a:endParaRPr lang="en-US" dirty="0"/>
           </a:p>
@@ -6524,7 +6694,7 @@
           <a:p>
             <a:fld id="{1160EA64-D806-43AC-9DF2-F8C432F32B4C}" type="datetimeFigureOut">
               <a:rPr lang="en-US" dirty="0"/>
-              <a:t>1/2/2018</a:t>
+              <a:t>1/4/2018</a:t>
             </a:fld>
             <a:endParaRPr lang="en-US" dirty="0"/>
           </a:p>
@@ -6877,7 +7047,7 @@
             <a:fld id="{1160EA64-D806-43AC-9DF2-F8C432F32B4C}" type="datetimeFigureOut">
               <a:rPr lang="en-US" dirty="0"/>
               <a:pPr/>
-              <a:t>1/2/2018</a:t>
+              <a:t>1/4/2018</a:t>
             </a:fld>
             <a:endParaRPr lang="en-US" dirty="0"/>
           </a:p>
@@ -7112,7 +7282,7 @@
           <a:p>
             <a:fld id="{1160EA64-D806-43AC-9DF2-F8C432F32B4C}" type="datetimeFigureOut">
               <a:rPr lang="en-US" dirty="0"/>
-              <a:t>1/2/2018</a:t>
+              <a:t>1/4/2018</a:t>
             </a:fld>
             <a:endParaRPr lang="en-US" dirty="0"/>
           </a:p>
@@ -8636,6 +8806,36 @@
           </a:graphicData>
         </a:graphic>
       </p:graphicFrame>
+      <p:pic>
+        <p:nvPicPr>
+          <p:cNvPr id="9" name="Picture 8">
+            <a:extLst>
+              <a:ext uri="{FF2B5EF4-FFF2-40B4-BE49-F238E27FC236}">
+                <a16:creationId xmlns:a16="http://schemas.microsoft.com/office/drawing/2014/main" id="{9A9EDFAE-FD57-4636-91D2-170D0C548F86}"/>
+              </a:ext>
+            </a:extLst>
+          </p:cNvPr>
+          <p:cNvPicPr>
+            <a:picLocks noChangeAspect="1"/>
+          </p:cNvPicPr>
+          <p:nvPr/>
+        </p:nvPicPr>
+        <p:blipFill>
+          <a:blip r:embed="rId3"/>
+          <a:stretch>
+            <a:fillRect/>
+          </a:stretch>
+        </p:blipFill>
+        <p:spPr>
+          <a:xfrm>
+            <a:off x="11182662" y="5848662"/>
+            <a:ext cx="1009338" cy="1009338"/>
+          </a:xfrm>
+          <a:prstGeom prst="rect">
+            <a:avLst/>
+          </a:prstGeom>
+        </p:spPr>
+      </p:pic>
     </p:spTree>
     <p:extLst>
       <p:ext uri="{BB962C8B-B14F-4D97-AF65-F5344CB8AC3E}">
@@ -8996,6 +9196,1518 @@
       </p:sp>
       <p:pic>
         <p:nvPicPr>
+          <p:cNvPr id="5" name="Picture 4">
+            <a:extLst>
+              <a:ext uri="{FF2B5EF4-FFF2-40B4-BE49-F238E27FC236}">
+                <a16:creationId xmlns:a16="http://schemas.microsoft.com/office/drawing/2014/main" id="{E53BF160-80D1-47C5-A2B9-F7DF1E9A5E19}"/>
+              </a:ext>
+            </a:extLst>
+          </p:cNvPr>
+          <p:cNvPicPr>
+            <a:picLocks noChangeAspect="1"/>
+          </p:cNvPicPr>
+          <p:nvPr/>
+        </p:nvPicPr>
+        <p:blipFill>
+          <a:blip r:embed="rId3"/>
+          <a:stretch>
+            <a:fillRect/>
+          </a:stretch>
+        </p:blipFill>
+        <p:spPr>
+          <a:xfrm>
+            <a:off x="11182662" y="5848662"/>
+            <a:ext cx="1009338" cy="1009338"/>
+          </a:xfrm>
+          <a:prstGeom prst="rect">
+            <a:avLst/>
+          </a:prstGeom>
+        </p:spPr>
+      </p:pic>
+      <p:graphicFrame>
+        <p:nvGraphicFramePr>
+          <p:cNvPr id="7" name="Content Placeholder 6">
+            <a:extLst>
+              <a:ext uri="{FF2B5EF4-FFF2-40B4-BE49-F238E27FC236}">
+                <a16:creationId xmlns:a16="http://schemas.microsoft.com/office/drawing/2014/main" id="{D1CA604D-6BCD-4CC7-AFDC-9E8710DD9F3A}"/>
+              </a:ext>
+            </a:extLst>
+          </p:cNvPr>
+          <p:cNvGraphicFramePr>
+            <a:graphicFrameLocks noGrp="1"/>
+          </p:cNvGraphicFramePr>
+          <p:nvPr>
+            <p:ph idx="1"/>
+            <p:extLst>
+              <p:ext uri="{D42A27DB-BD31-4B8C-83A1-F6EECF244321}">
+                <p14:modId xmlns:p14="http://schemas.microsoft.com/office/powerpoint/2010/main" val="2239246014"/>
+              </p:ext>
+            </p:extLst>
+          </p:nvPr>
+        </p:nvGraphicFramePr>
+        <p:xfrm>
+          <a:off x="1274164" y="2122167"/>
+          <a:ext cx="9563724" cy="464695"/>
+        </p:xfrm>
+        <a:graphic>
+          <a:graphicData uri="http://schemas.openxmlformats.org/drawingml/2006/table">
+            <a:tbl>
+              <a:tblPr firstRow="1" bandRow="1">
+                <a:tableStyleId>{5C22544A-7EE6-4342-B048-85BDC9FD1C3A}</a:tableStyleId>
+              </a:tblPr>
+              <a:tblGrid>
+                <a:gridCol w="2908092">
+                  <a:extLst>
+                    <a:ext uri="{9D8B030D-6E8A-4147-A177-3AD203B41FA5}">
+                      <a16:colId xmlns:a16="http://schemas.microsoft.com/office/drawing/2014/main" val="3570394154"/>
+                    </a:ext>
+                  </a:extLst>
+                </a:gridCol>
+                <a:gridCol w="3072983">
+                  <a:extLst>
+                    <a:ext uri="{9D8B030D-6E8A-4147-A177-3AD203B41FA5}">
+                      <a16:colId xmlns:a16="http://schemas.microsoft.com/office/drawing/2014/main" val="1430584674"/>
+                    </a:ext>
+                  </a:extLst>
+                </a:gridCol>
+                <a:gridCol w="3582649">
+                  <a:extLst>
+                    <a:ext uri="{9D8B030D-6E8A-4147-A177-3AD203B41FA5}">
+                      <a16:colId xmlns:a16="http://schemas.microsoft.com/office/drawing/2014/main" val="927683361"/>
+                    </a:ext>
+                  </a:extLst>
+                </a:gridCol>
+              </a:tblGrid>
+              <a:tr h="464695">
+                <a:tc>
+                  <a:txBody>
+                    <a:bodyPr/>
+                    <a:lstStyle/>
+                    <a:p>
+                      <a:pPr algn="ctr"/>
+                      <a:r>
+                        <a:rPr lang="en-PH" b="0" dirty="0"/>
+                        <a:t>User Requirements</a:t>
+                      </a:r>
+                    </a:p>
+                  </a:txBody>
+                  <a:tcPr anchor="ctr">
+                    <a:solidFill>
+                      <a:schemeClr val="accent2"/>
+                    </a:solidFill>
+                  </a:tcPr>
+                </a:tc>
+                <a:tc>
+                  <a:txBody>
+                    <a:bodyPr/>
+                    <a:lstStyle/>
+                    <a:p>
+                      <a:pPr algn="ctr"/>
+                      <a:r>
+                        <a:rPr lang="en-PH" b="0" dirty="0"/>
+                        <a:t>Current System </a:t>
+                      </a:r>
+                    </a:p>
+                  </a:txBody>
+                  <a:tcPr anchor="ctr">
+                    <a:solidFill>
+                      <a:schemeClr val="accent2"/>
+                    </a:solidFill>
+                  </a:tcPr>
+                </a:tc>
+                <a:tc>
+                  <a:txBody>
+                    <a:bodyPr/>
+                    <a:lstStyle/>
+                    <a:p>
+                      <a:pPr algn="ctr"/>
+                      <a:r>
+                        <a:rPr lang="en-PH" b="0" dirty="0"/>
+                        <a:t>Proposed Changes</a:t>
+                      </a:r>
+                    </a:p>
+                  </a:txBody>
+                  <a:tcPr anchor="ctr">
+                    <a:solidFill>
+                      <a:schemeClr val="accent2"/>
+                    </a:solidFill>
+                  </a:tcPr>
+                </a:tc>
+                <a:extLst>
+                  <a:ext uri="{0D108BD9-81ED-4DB2-BD59-A6C34878D82A}">
+                    <a16:rowId xmlns:a16="http://schemas.microsoft.com/office/drawing/2014/main" val="1429810749"/>
+                  </a:ext>
+                </a:extLst>
+              </a:tr>
+            </a:tbl>
+          </a:graphicData>
+        </a:graphic>
+      </p:graphicFrame>
+      <p:graphicFrame>
+        <p:nvGraphicFramePr>
+          <p:cNvPr id="8" name="Content Placeholder 6">
+            <a:extLst>
+              <a:ext uri="{FF2B5EF4-FFF2-40B4-BE49-F238E27FC236}">
+                <a16:creationId xmlns:a16="http://schemas.microsoft.com/office/drawing/2014/main" id="{5F7B42E5-F89D-44E7-BD48-045EE1C39004}"/>
+              </a:ext>
+            </a:extLst>
+          </p:cNvPr>
+          <p:cNvGraphicFramePr>
+            <a:graphicFrameLocks/>
+          </p:cNvGraphicFramePr>
+          <p:nvPr>
+            <p:extLst>
+              <p:ext uri="{D42A27DB-BD31-4B8C-83A1-F6EECF244321}">
+                <p14:modId xmlns:p14="http://schemas.microsoft.com/office/powerpoint/2010/main" val="271162007"/>
+              </p:ext>
+            </p:extLst>
+          </p:nvPr>
+        </p:nvGraphicFramePr>
+        <p:xfrm>
+          <a:off x="1274164" y="2608288"/>
+          <a:ext cx="9563725" cy="1600200"/>
+        </p:xfrm>
+        <a:graphic>
+          <a:graphicData uri="http://schemas.openxmlformats.org/drawingml/2006/table">
+            <a:tbl>
+              <a:tblPr firstRow="1" bandRow="1">
+                <a:tableStyleId>{5C22544A-7EE6-4342-B048-85BDC9FD1C3A}</a:tableStyleId>
+              </a:tblPr>
+              <a:tblGrid>
+                <a:gridCol w="2908091">
+                  <a:extLst>
+                    <a:ext uri="{9D8B030D-6E8A-4147-A177-3AD203B41FA5}">
+                      <a16:colId xmlns:a16="http://schemas.microsoft.com/office/drawing/2014/main" val="3570394154"/>
+                    </a:ext>
+                  </a:extLst>
+                </a:gridCol>
+                <a:gridCol w="3072983">
+                  <a:extLst>
+                    <a:ext uri="{9D8B030D-6E8A-4147-A177-3AD203B41FA5}">
+                      <a16:colId xmlns:a16="http://schemas.microsoft.com/office/drawing/2014/main" val="1430584674"/>
+                    </a:ext>
+                  </a:extLst>
+                </a:gridCol>
+                <a:gridCol w="3582651">
+                  <a:extLst>
+                    <a:ext uri="{9D8B030D-6E8A-4147-A177-3AD203B41FA5}">
+                      <a16:colId xmlns:a16="http://schemas.microsoft.com/office/drawing/2014/main" val="927683361"/>
+                    </a:ext>
+                  </a:extLst>
+                </a:gridCol>
+              </a:tblGrid>
+              <a:tr h="835702">
+                <a:tc>
+                  <a:txBody>
+                    <a:bodyPr/>
+                    <a:lstStyle/>
+                    <a:p>
+                      <a:pPr algn="ctr"/>
+                      <a:r>
+                        <a:rPr lang="en-PH" sz="1650" b="0" dirty="0">
+                          <a:solidFill>
+                            <a:schemeClr val="tx1"/>
+                          </a:solidFill>
+                        </a:rPr>
+                        <a:t>1. Gather escalation data </a:t>
+                      </a:r>
+                    </a:p>
+                  </a:txBody>
+                  <a:tcPr anchor="ctr">
+                    <a:solidFill>
+                      <a:schemeClr val="accent2">
+                        <a:lumMod val="40000"/>
+                        <a:lumOff val="60000"/>
+                      </a:schemeClr>
+                    </a:solidFill>
+                  </a:tcPr>
+                </a:tc>
+                <a:tc>
+                  <a:txBody>
+                    <a:bodyPr/>
+                    <a:lstStyle/>
+                    <a:p>
+                      <a:pPr algn="just"/>
+                      <a:r>
+                        <a:rPr lang="en-PH" sz="1650" b="0" dirty="0">
+                          <a:solidFill>
+                            <a:schemeClr val="tx1"/>
+                          </a:solidFill>
+                        </a:rPr>
+                        <a:t>Issues are recorder by the Guest Service Center using Freshdesk and Excel</a:t>
+                      </a:r>
+                    </a:p>
+                  </a:txBody>
+                  <a:tcPr anchor="ctr">
+                    <a:solidFill>
+                      <a:schemeClr val="accent2">
+                        <a:lumMod val="40000"/>
+                        <a:lumOff val="60000"/>
+                      </a:schemeClr>
+                    </a:solidFill>
+                  </a:tcPr>
+                </a:tc>
+                <a:tc>
+                  <a:txBody>
+                    <a:bodyPr/>
+                    <a:lstStyle/>
+                    <a:p>
+                      <a:pPr algn="just">
+                        <a:lnSpc>
+                          <a:spcPct val="100000"/>
+                        </a:lnSpc>
+                      </a:pPr>
+                      <a:r>
+                        <a:rPr lang="en-PH" sz="1650" b="0" dirty="0">
+                          <a:solidFill>
+                            <a:schemeClr val="tx1"/>
+                          </a:solidFill>
+                        </a:rPr>
+                        <a:t>Develop an escalation management module that does the following: </a:t>
+                      </a:r>
+                    </a:p>
+                    <a:p>
+                      <a:pPr algn="just">
+                        <a:lnSpc>
+                          <a:spcPct val="100000"/>
+                        </a:lnSpc>
+                      </a:pPr>
+                      <a:endParaRPr lang="en-PH" sz="1650" b="0" dirty="0">
+                        <a:solidFill>
+                          <a:schemeClr val="tx1"/>
+                        </a:solidFill>
+                      </a:endParaRPr>
+                    </a:p>
+                    <a:p>
+                      <a:pPr marL="285750" indent="-285750" algn="just">
+                        <a:lnSpc>
+                          <a:spcPct val="100000"/>
+                        </a:lnSpc>
+                        <a:buFont typeface="Arial" panose="020B0604020202020204" pitchFamily="34" charset="0"/>
+                        <a:buChar char="•"/>
+                      </a:pPr>
+                      <a:r>
+                        <a:rPr lang="en-PH" sz="1650" b="0" dirty="0">
+                          <a:solidFill>
+                            <a:schemeClr val="tx1"/>
+                          </a:solidFill>
+                        </a:rPr>
+                        <a:t>Automatically gathers all the escalation data entered in to the module</a:t>
+                      </a:r>
+                    </a:p>
+                  </a:txBody>
+                  <a:tcPr anchor="ctr">
+                    <a:solidFill>
+                      <a:schemeClr val="accent2">
+                        <a:lumMod val="40000"/>
+                        <a:lumOff val="60000"/>
+                      </a:schemeClr>
+                    </a:solidFill>
+                  </a:tcPr>
+                </a:tc>
+                <a:extLst>
+                  <a:ext uri="{0D108BD9-81ED-4DB2-BD59-A6C34878D82A}">
+                    <a16:rowId xmlns:a16="http://schemas.microsoft.com/office/drawing/2014/main" val="1429810749"/>
+                  </a:ext>
+                </a:extLst>
+              </a:tr>
+            </a:tbl>
+          </a:graphicData>
+        </a:graphic>
+      </p:graphicFrame>
+      <p:graphicFrame>
+        <p:nvGraphicFramePr>
+          <p:cNvPr id="9" name="Content Placeholder 6">
+            <a:extLst>
+              <a:ext uri="{FF2B5EF4-FFF2-40B4-BE49-F238E27FC236}">
+                <a16:creationId xmlns:a16="http://schemas.microsoft.com/office/drawing/2014/main" id="{2828C76E-6487-4AAE-8984-053CCE765A8C}"/>
+              </a:ext>
+            </a:extLst>
+          </p:cNvPr>
+          <p:cNvGraphicFramePr>
+            <a:graphicFrameLocks/>
+          </p:cNvGraphicFramePr>
+          <p:nvPr>
+            <p:extLst>
+              <p:ext uri="{D42A27DB-BD31-4B8C-83A1-F6EECF244321}">
+                <p14:modId xmlns:p14="http://schemas.microsoft.com/office/powerpoint/2010/main" val="3260848072"/>
+              </p:ext>
+            </p:extLst>
+          </p:nvPr>
+        </p:nvGraphicFramePr>
+        <p:xfrm>
+          <a:off x="1274164" y="4208488"/>
+          <a:ext cx="9563724" cy="2103120"/>
+        </p:xfrm>
+        <a:graphic>
+          <a:graphicData uri="http://schemas.openxmlformats.org/drawingml/2006/table">
+            <a:tbl>
+              <a:tblPr firstRow="1" bandRow="1">
+                <a:tableStyleId>{5C22544A-7EE6-4342-B048-85BDC9FD1C3A}</a:tableStyleId>
+              </a:tblPr>
+              <a:tblGrid>
+                <a:gridCol w="2908092">
+                  <a:extLst>
+                    <a:ext uri="{9D8B030D-6E8A-4147-A177-3AD203B41FA5}">
+                      <a16:colId xmlns:a16="http://schemas.microsoft.com/office/drawing/2014/main" val="3570394154"/>
+                    </a:ext>
+                  </a:extLst>
+                </a:gridCol>
+                <a:gridCol w="3072983">
+                  <a:extLst>
+                    <a:ext uri="{9D8B030D-6E8A-4147-A177-3AD203B41FA5}">
+                      <a16:colId xmlns:a16="http://schemas.microsoft.com/office/drawing/2014/main" val="1430584674"/>
+                    </a:ext>
+                  </a:extLst>
+                </a:gridCol>
+                <a:gridCol w="3582649">
+                  <a:extLst>
+                    <a:ext uri="{9D8B030D-6E8A-4147-A177-3AD203B41FA5}">
+                      <a16:colId xmlns:a16="http://schemas.microsoft.com/office/drawing/2014/main" val="927683361"/>
+                    </a:ext>
+                  </a:extLst>
+                </a:gridCol>
+              </a:tblGrid>
+              <a:tr h="835702">
+                <a:tc>
+                  <a:txBody>
+                    <a:bodyPr/>
+                    <a:lstStyle/>
+                    <a:p>
+                      <a:pPr algn="ctr"/>
+                      <a:r>
+                        <a:rPr lang="en-PH" sz="1650" b="0" dirty="0">
+                          <a:solidFill>
+                            <a:schemeClr val="tx1"/>
+                          </a:solidFill>
+                        </a:rPr>
+                        <a:t>2. Improve escalation process </a:t>
+                      </a:r>
+                    </a:p>
+                  </a:txBody>
+                  <a:tcPr anchor="ctr">
+                    <a:solidFill>
+                      <a:schemeClr val="accent2">
+                        <a:lumMod val="40000"/>
+                        <a:lumOff val="60000"/>
+                      </a:schemeClr>
+                    </a:solidFill>
+                  </a:tcPr>
+                </a:tc>
+                <a:tc>
+                  <a:txBody>
+                    <a:bodyPr/>
+                    <a:lstStyle/>
+                    <a:p>
+                      <a:pPr algn="just"/>
+                      <a:r>
+                        <a:rPr lang="en-PH" sz="1650" b="0" dirty="0">
+                          <a:solidFill>
+                            <a:schemeClr val="tx1"/>
+                          </a:solidFill>
+                        </a:rPr>
+                        <a:t>Limited escalation processes</a:t>
+                      </a:r>
+                    </a:p>
+                  </a:txBody>
+                  <a:tcPr anchor="ctr">
+                    <a:solidFill>
+                      <a:schemeClr val="accent2">
+                        <a:lumMod val="40000"/>
+                        <a:lumOff val="60000"/>
+                      </a:schemeClr>
+                    </a:solidFill>
+                  </a:tcPr>
+                </a:tc>
+                <a:tc>
+                  <a:txBody>
+                    <a:bodyPr/>
+                    <a:lstStyle/>
+                    <a:p>
+                      <a:pPr algn="just"/>
+                      <a:r>
+                        <a:rPr lang="en-PH" sz="1650" b="0" dirty="0">
+                          <a:solidFill>
+                            <a:schemeClr val="tx1"/>
+                          </a:solidFill>
+                        </a:rPr>
+                        <a:t>Develop an escalation management module that does the following:</a:t>
+                      </a:r>
+                    </a:p>
+                    <a:p>
+                      <a:pPr algn="just"/>
+                      <a:endParaRPr lang="en-PH" sz="1650" b="0" dirty="0">
+                        <a:solidFill>
+                          <a:schemeClr val="tx1"/>
+                        </a:solidFill>
+                      </a:endParaRPr>
+                    </a:p>
+                    <a:p>
+                      <a:pPr marL="285750" indent="-285750" algn="just">
+                        <a:buFont typeface="Arial" panose="020B0604020202020204" pitchFamily="34" charset="0"/>
+                        <a:buChar char="•"/>
+                      </a:pPr>
+                      <a:r>
+                        <a:rPr lang="en-PH" sz="1650" b="0" dirty="0">
+                          <a:solidFill>
+                            <a:schemeClr val="tx1"/>
+                          </a:solidFill>
+                        </a:rPr>
+                        <a:t>Receives service tickets which exceeds within the given SLA</a:t>
+                      </a:r>
+                    </a:p>
+                    <a:p>
+                      <a:pPr marL="0" indent="0" algn="just">
+                        <a:buFont typeface="Arial" panose="020B0604020202020204" pitchFamily="34" charset="0"/>
+                        <a:buNone/>
+                      </a:pPr>
+                      <a:endParaRPr lang="en-PH" sz="1650" b="0" dirty="0">
+                        <a:solidFill>
+                          <a:schemeClr val="tx1"/>
+                        </a:solidFill>
+                      </a:endParaRPr>
+                    </a:p>
+                    <a:p>
+                      <a:pPr marL="285750" indent="-285750" algn="l">
+                        <a:buFont typeface="Arial" panose="020B0604020202020204" pitchFamily="34" charset="0"/>
+                        <a:buChar char="•"/>
+                      </a:pPr>
+                      <a:r>
+                        <a:rPr lang="en-PH" sz="1650" b="0" dirty="0">
+                          <a:solidFill>
+                            <a:schemeClr val="tx1"/>
+                          </a:solidFill>
+                        </a:rPr>
+                        <a:t>Re-assign  to the senior employee level </a:t>
+                      </a:r>
+                    </a:p>
+                  </a:txBody>
+                  <a:tcPr anchor="ctr">
+                    <a:solidFill>
+                      <a:schemeClr val="accent2">
+                        <a:lumMod val="40000"/>
+                        <a:lumOff val="60000"/>
+                      </a:schemeClr>
+                    </a:solidFill>
+                  </a:tcPr>
+                </a:tc>
+                <a:extLst>
+                  <a:ext uri="{0D108BD9-81ED-4DB2-BD59-A6C34878D82A}">
+                    <a16:rowId xmlns:a16="http://schemas.microsoft.com/office/drawing/2014/main" val="1429810749"/>
+                  </a:ext>
+                </a:extLst>
+              </a:tr>
+            </a:tbl>
+          </a:graphicData>
+        </a:graphic>
+      </p:graphicFrame>
+    </p:spTree>
+    <p:extLst>
+      <p:ext uri="{BB962C8B-B14F-4D97-AF65-F5344CB8AC3E}">
+        <p14:creationId xmlns:p14="http://schemas.microsoft.com/office/powerpoint/2010/main" val="2086066669"/>
+      </p:ext>
+    </p:extLst>
+  </p:cSld>
+  <p:clrMapOvr>
+    <a:masterClrMapping/>
+  </p:clrMapOvr>
+  <p:timing>
+    <p:tnLst>
+      <p:par>
+        <p:cTn id="1" dur="indefinite" restart="never" nodeType="tmRoot">
+          <p:childTnLst>
+            <p:seq concurrent="1" nextAc="seek">
+              <p:cTn id="2" dur="indefinite" nodeType="mainSeq">
+                <p:childTnLst>
+                  <p:par>
+                    <p:cTn id="3" fill="hold">
+                      <p:stCondLst>
+                        <p:cond delay="indefinite"/>
+                      </p:stCondLst>
+                      <p:childTnLst>
+                        <p:par>
+                          <p:cTn id="4" fill="hold">
+                            <p:stCondLst>
+                              <p:cond delay="0"/>
+                            </p:stCondLst>
+                            <p:childTnLst>
+                              <p:par>
+                                <p:cTn id="5" presetID="10" presetClass="entr" presetSubtype="0" fill="hold" nodeType="clickEffect">
+                                  <p:stCondLst>
+                                    <p:cond delay="0"/>
+                                  </p:stCondLst>
+                                  <p:childTnLst>
+                                    <p:set>
+                                      <p:cBhvr>
+                                        <p:cTn id="6" dur="1" fill="hold">
+                                          <p:stCondLst>
+                                            <p:cond delay="0"/>
+                                          </p:stCondLst>
+                                        </p:cTn>
+                                        <p:tgtEl>
+                                          <p:spTgt spid="7"/>
+                                        </p:tgtEl>
+                                        <p:attrNameLst>
+                                          <p:attrName>style.visibility</p:attrName>
+                                        </p:attrNameLst>
+                                      </p:cBhvr>
+                                      <p:to>
+                                        <p:strVal val="visible"/>
+                                      </p:to>
+                                    </p:set>
+                                    <p:animEffect transition="in" filter="fade">
+                                      <p:cBhvr>
+                                        <p:cTn id="7" dur="500"/>
+                                        <p:tgtEl>
+                                          <p:spTgt spid="7"/>
+                                        </p:tgtEl>
+                                      </p:cBhvr>
+                                    </p:animEffect>
+                                  </p:childTnLst>
+                                </p:cTn>
+                              </p:par>
+                            </p:childTnLst>
+                          </p:cTn>
+                        </p:par>
+                      </p:childTnLst>
+                    </p:cTn>
+                  </p:par>
+                  <p:par>
+                    <p:cTn id="8" fill="hold">
+                      <p:stCondLst>
+                        <p:cond delay="indefinite"/>
+                      </p:stCondLst>
+                      <p:childTnLst>
+                        <p:par>
+                          <p:cTn id="9" fill="hold">
+                            <p:stCondLst>
+                              <p:cond delay="0"/>
+                            </p:stCondLst>
+                            <p:childTnLst>
+                              <p:par>
+                                <p:cTn id="10" presetID="10" presetClass="entr" presetSubtype="0" fill="hold" nodeType="clickEffect">
+                                  <p:stCondLst>
+                                    <p:cond delay="0"/>
+                                  </p:stCondLst>
+                                  <p:childTnLst>
+                                    <p:set>
+                                      <p:cBhvr>
+                                        <p:cTn id="11" dur="1" fill="hold">
+                                          <p:stCondLst>
+                                            <p:cond delay="0"/>
+                                          </p:stCondLst>
+                                        </p:cTn>
+                                        <p:tgtEl>
+                                          <p:spTgt spid="8"/>
+                                        </p:tgtEl>
+                                        <p:attrNameLst>
+                                          <p:attrName>style.visibility</p:attrName>
+                                        </p:attrNameLst>
+                                      </p:cBhvr>
+                                      <p:to>
+                                        <p:strVal val="visible"/>
+                                      </p:to>
+                                    </p:set>
+                                    <p:animEffect transition="in" filter="fade">
+                                      <p:cBhvr>
+                                        <p:cTn id="12" dur="500"/>
+                                        <p:tgtEl>
+                                          <p:spTgt spid="8"/>
+                                        </p:tgtEl>
+                                      </p:cBhvr>
+                                    </p:animEffect>
+                                  </p:childTnLst>
+                                </p:cTn>
+                              </p:par>
+                            </p:childTnLst>
+                          </p:cTn>
+                        </p:par>
+                      </p:childTnLst>
+                    </p:cTn>
+                  </p:par>
+                  <p:par>
+                    <p:cTn id="13" fill="hold">
+                      <p:stCondLst>
+                        <p:cond delay="indefinite"/>
+                      </p:stCondLst>
+                      <p:childTnLst>
+                        <p:par>
+                          <p:cTn id="14" fill="hold">
+                            <p:stCondLst>
+                              <p:cond delay="0"/>
+                            </p:stCondLst>
+                            <p:childTnLst>
+                              <p:par>
+                                <p:cTn id="15" presetID="10" presetClass="entr" presetSubtype="0" fill="hold" nodeType="clickEffect">
+                                  <p:stCondLst>
+                                    <p:cond delay="0"/>
+                                  </p:stCondLst>
+                                  <p:childTnLst>
+                                    <p:set>
+                                      <p:cBhvr>
+                                        <p:cTn id="16" dur="1" fill="hold">
+                                          <p:stCondLst>
+                                            <p:cond delay="0"/>
+                                          </p:stCondLst>
+                                        </p:cTn>
+                                        <p:tgtEl>
+                                          <p:spTgt spid="9"/>
+                                        </p:tgtEl>
+                                        <p:attrNameLst>
+                                          <p:attrName>style.visibility</p:attrName>
+                                        </p:attrNameLst>
+                                      </p:cBhvr>
+                                      <p:to>
+                                        <p:strVal val="visible"/>
+                                      </p:to>
+                                    </p:set>
+                                    <p:animEffect transition="in" filter="fade">
+                                      <p:cBhvr>
+                                        <p:cTn id="17" dur="500"/>
+                                        <p:tgtEl>
+                                          <p:spTgt spid="9"/>
+                                        </p:tgtEl>
+                                      </p:cBhvr>
+                                    </p:animEffect>
+                                  </p:childTnLst>
+                                </p:cTn>
+                              </p:par>
+                            </p:childTnLst>
+                          </p:cTn>
+                        </p:par>
+                      </p:childTnLst>
+                    </p:cTn>
+                  </p:par>
+                </p:childTnLst>
+              </p:cTn>
+              <p:prevCondLst>
+                <p:cond evt="onPrev" delay="0">
+                  <p:tgtEl>
+                    <p:sldTgt/>
+                  </p:tgtEl>
+                </p:cond>
+              </p:prevCondLst>
+              <p:nextCondLst>
+                <p:cond evt="onNext" delay="0">
+                  <p:tgtEl>
+                    <p:sldTgt/>
+                  </p:tgtEl>
+                </p:cond>
+              </p:nextCondLst>
+            </p:seq>
+          </p:childTnLst>
+        </p:cTn>
+      </p:par>
+    </p:tnLst>
+  </p:timing>
+</p:sld>
+</file>
+
+<file path=ppt/slides/slide12.xml><?xml version="1.0" encoding="utf-8"?>
+<p:sld xmlns:a="http://schemas.openxmlformats.org/drawingml/2006/main" xmlns:r="http://schemas.openxmlformats.org/officeDocument/2006/relationships" xmlns:p="http://schemas.openxmlformats.org/presentationml/2006/main">
+  <p:cSld>
+    <p:spTree>
+      <p:nvGrpSpPr>
+        <p:cNvPr id="1" name=""/>
+        <p:cNvGrpSpPr/>
+        <p:nvPr/>
+      </p:nvGrpSpPr>
+      <p:grpSpPr>
+        <a:xfrm>
+          <a:off x="0" y="0"/>
+          <a:ext cx="0" cy="0"/>
+          <a:chOff x="0" y="0"/>
+          <a:chExt cx="0" cy="0"/>
+        </a:xfrm>
+      </p:grpSpPr>
+      <p:sp>
+        <p:nvSpPr>
+          <p:cNvPr id="2" name="Title 1">
+            <a:extLst>
+              <a:ext uri="{FF2B5EF4-FFF2-40B4-BE49-F238E27FC236}">
+                <a16:creationId xmlns:a16="http://schemas.microsoft.com/office/drawing/2014/main" id="{0BB624B8-9446-4B1F-9938-A41C9A647B6A}"/>
+              </a:ext>
+            </a:extLst>
+          </p:cNvPr>
+          <p:cNvSpPr>
+            <a:spLocks noGrp="1"/>
+          </p:cNvSpPr>
+          <p:nvPr>
+            <p:ph type="title"/>
+          </p:nvPr>
+        </p:nvSpPr>
+        <p:spPr>
+          <a:xfrm>
+            <a:off x="2231135" y="578930"/>
+            <a:ext cx="7729728" cy="1188720"/>
+          </a:xfrm>
+        </p:spPr>
+        <p:txBody>
+          <a:bodyPr/>
+          <a:lstStyle/>
+          <a:p>
+            <a:r>
+              <a:rPr lang="en-PH" dirty="0"/>
+              <a:t>GAP ANALYSIS</a:t>
+            </a:r>
+          </a:p>
+        </p:txBody>
+      </p:sp>
+      <p:pic>
+        <p:nvPicPr>
+          <p:cNvPr id="5" name="Picture 4">
+            <a:extLst>
+              <a:ext uri="{FF2B5EF4-FFF2-40B4-BE49-F238E27FC236}">
+                <a16:creationId xmlns:a16="http://schemas.microsoft.com/office/drawing/2014/main" id="{E53BF160-80D1-47C5-A2B9-F7DF1E9A5E19}"/>
+              </a:ext>
+            </a:extLst>
+          </p:cNvPr>
+          <p:cNvPicPr>
+            <a:picLocks noChangeAspect="1"/>
+          </p:cNvPicPr>
+          <p:nvPr/>
+        </p:nvPicPr>
+        <p:blipFill>
+          <a:blip r:embed="rId3"/>
+          <a:stretch>
+            <a:fillRect/>
+          </a:stretch>
+        </p:blipFill>
+        <p:spPr>
+          <a:xfrm>
+            <a:off x="11182662" y="5848662"/>
+            <a:ext cx="1009338" cy="1009338"/>
+          </a:xfrm>
+          <a:prstGeom prst="rect">
+            <a:avLst/>
+          </a:prstGeom>
+        </p:spPr>
+      </p:pic>
+      <p:graphicFrame>
+        <p:nvGraphicFramePr>
+          <p:cNvPr id="7" name="Content Placeholder 6">
+            <a:extLst>
+              <a:ext uri="{FF2B5EF4-FFF2-40B4-BE49-F238E27FC236}">
+                <a16:creationId xmlns:a16="http://schemas.microsoft.com/office/drawing/2014/main" id="{D1CA604D-6BCD-4CC7-AFDC-9E8710DD9F3A}"/>
+              </a:ext>
+            </a:extLst>
+          </p:cNvPr>
+          <p:cNvGraphicFramePr>
+            <a:graphicFrameLocks noGrp="1"/>
+          </p:cNvGraphicFramePr>
+          <p:nvPr>
+            <p:ph idx="1"/>
+            <p:extLst>
+              <p:ext uri="{D42A27DB-BD31-4B8C-83A1-F6EECF244321}">
+                <p14:modId xmlns:p14="http://schemas.microsoft.com/office/powerpoint/2010/main" val="3335043615"/>
+              </p:ext>
+            </p:extLst>
+          </p:nvPr>
+        </p:nvGraphicFramePr>
+        <p:xfrm>
+          <a:off x="1274164" y="2257077"/>
+          <a:ext cx="9563724" cy="464695"/>
+        </p:xfrm>
+        <a:graphic>
+          <a:graphicData uri="http://schemas.openxmlformats.org/drawingml/2006/table">
+            <a:tbl>
+              <a:tblPr firstRow="1" bandRow="1">
+                <a:tableStyleId>{5C22544A-7EE6-4342-B048-85BDC9FD1C3A}</a:tableStyleId>
+              </a:tblPr>
+              <a:tblGrid>
+                <a:gridCol w="2908092">
+                  <a:extLst>
+                    <a:ext uri="{9D8B030D-6E8A-4147-A177-3AD203B41FA5}">
+                      <a16:colId xmlns:a16="http://schemas.microsoft.com/office/drawing/2014/main" val="3570394154"/>
+                    </a:ext>
+                  </a:extLst>
+                </a:gridCol>
+                <a:gridCol w="3072983">
+                  <a:extLst>
+                    <a:ext uri="{9D8B030D-6E8A-4147-A177-3AD203B41FA5}">
+                      <a16:colId xmlns:a16="http://schemas.microsoft.com/office/drawing/2014/main" val="1430584674"/>
+                    </a:ext>
+                  </a:extLst>
+                </a:gridCol>
+                <a:gridCol w="3582649">
+                  <a:extLst>
+                    <a:ext uri="{9D8B030D-6E8A-4147-A177-3AD203B41FA5}">
+                      <a16:colId xmlns:a16="http://schemas.microsoft.com/office/drawing/2014/main" val="927683361"/>
+                    </a:ext>
+                  </a:extLst>
+                </a:gridCol>
+              </a:tblGrid>
+              <a:tr h="464695">
+                <a:tc>
+                  <a:txBody>
+                    <a:bodyPr/>
+                    <a:lstStyle/>
+                    <a:p>
+                      <a:pPr algn="ctr"/>
+                      <a:r>
+                        <a:rPr lang="en-PH" b="0" dirty="0"/>
+                        <a:t>User Requirements</a:t>
+                      </a:r>
+                    </a:p>
+                  </a:txBody>
+                  <a:tcPr anchor="ctr">
+                    <a:solidFill>
+                      <a:schemeClr val="accent2"/>
+                    </a:solidFill>
+                  </a:tcPr>
+                </a:tc>
+                <a:tc>
+                  <a:txBody>
+                    <a:bodyPr/>
+                    <a:lstStyle/>
+                    <a:p>
+                      <a:pPr algn="ctr"/>
+                      <a:r>
+                        <a:rPr lang="en-PH" b="0" dirty="0"/>
+                        <a:t>Current System </a:t>
+                      </a:r>
+                    </a:p>
+                  </a:txBody>
+                  <a:tcPr anchor="ctr">
+                    <a:solidFill>
+                      <a:schemeClr val="accent2"/>
+                    </a:solidFill>
+                  </a:tcPr>
+                </a:tc>
+                <a:tc>
+                  <a:txBody>
+                    <a:bodyPr/>
+                    <a:lstStyle/>
+                    <a:p>
+                      <a:pPr algn="ctr"/>
+                      <a:r>
+                        <a:rPr lang="en-PH" b="0" dirty="0"/>
+                        <a:t>Proposed Changes</a:t>
+                      </a:r>
+                    </a:p>
+                  </a:txBody>
+                  <a:tcPr anchor="ctr">
+                    <a:solidFill>
+                      <a:schemeClr val="accent2"/>
+                    </a:solidFill>
+                  </a:tcPr>
+                </a:tc>
+                <a:extLst>
+                  <a:ext uri="{0D108BD9-81ED-4DB2-BD59-A6C34878D82A}">
+                    <a16:rowId xmlns:a16="http://schemas.microsoft.com/office/drawing/2014/main" val="1429810749"/>
+                  </a:ext>
+                </a:extLst>
+              </a:tr>
+            </a:tbl>
+          </a:graphicData>
+        </a:graphic>
+      </p:graphicFrame>
+      <p:graphicFrame>
+        <p:nvGraphicFramePr>
+          <p:cNvPr id="8" name="Content Placeholder 6">
+            <a:extLst>
+              <a:ext uri="{FF2B5EF4-FFF2-40B4-BE49-F238E27FC236}">
+                <a16:creationId xmlns:a16="http://schemas.microsoft.com/office/drawing/2014/main" id="{5F7B42E5-F89D-44E7-BD48-045EE1C39004}"/>
+              </a:ext>
+            </a:extLst>
+          </p:cNvPr>
+          <p:cNvGraphicFramePr>
+            <a:graphicFrameLocks/>
+          </p:cNvGraphicFramePr>
+          <p:nvPr>
+            <p:extLst>
+              <p:ext uri="{D42A27DB-BD31-4B8C-83A1-F6EECF244321}">
+                <p14:modId xmlns:p14="http://schemas.microsoft.com/office/powerpoint/2010/main" val="1059983860"/>
+              </p:ext>
+            </p:extLst>
+          </p:nvPr>
+        </p:nvGraphicFramePr>
+        <p:xfrm>
+          <a:off x="1274164" y="2743198"/>
+          <a:ext cx="9563725" cy="1600200"/>
+        </p:xfrm>
+        <a:graphic>
+          <a:graphicData uri="http://schemas.openxmlformats.org/drawingml/2006/table">
+            <a:tbl>
+              <a:tblPr firstRow="1" bandRow="1">
+                <a:tableStyleId>{5C22544A-7EE6-4342-B048-85BDC9FD1C3A}</a:tableStyleId>
+              </a:tblPr>
+              <a:tblGrid>
+                <a:gridCol w="2908091">
+                  <a:extLst>
+                    <a:ext uri="{9D8B030D-6E8A-4147-A177-3AD203B41FA5}">
+                      <a16:colId xmlns:a16="http://schemas.microsoft.com/office/drawing/2014/main" val="3570394154"/>
+                    </a:ext>
+                  </a:extLst>
+                </a:gridCol>
+                <a:gridCol w="3072983">
+                  <a:extLst>
+                    <a:ext uri="{9D8B030D-6E8A-4147-A177-3AD203B41FA5}">
+                      <a16:colId xmlns:a16="http://schemas.microsoft.com/office/drawing/2014/main" val="1430584674"/>
+                    </a:ext>
+                  </a:extLst>
+                </a:gridCol>
+                <a:gridCol w="3582651">
+                  <a:extLst>
+                    <a:ext uri="{9D8B030D-6E8A-4147-A177-3AD203B41FA5}">
+                      <a16:colId xmlns:a16="http://schemas.microsoft.com/office/drawing/2014/main" val="927683361"/>
+                    </a:ext>
+                  </a:extLst>
+                </a:gridCol>
+              </a:tblGrid>
+              <a:tr h="835702">
+                <a:tc>
+                  <a:txBody>
+                    <a:bodyPr/>
+                    <a:lstStyle/>
+                    <a:p>
+                      <a:pPr algn="ctr"/>
+                      <a:r>
+                        <a:rPr lang="en-PH" sz="1650" b="0" dirty="0">
+                          <a:solidFill>
+                            <a:schemeClr val="tx1"/>
+                          </a:solidFill>
+                        </a:rPr>
+                        <a:t>3. Identify how services can be improved through an escalation process</a:t>
+                      </a:r>
+                    </a:p>
+                  </a:txBody>
+                  <a:tcPr anchor="ctr">
+                    <a:solidFill>
+                      <a:schemeClr val="accent2">
+                        <a:lumMod val="40000"/>
+                        <a:lumOff val="60000"/>
+                      </a:schemeClr>
+                    </a:solidFill>
+                  </a:tcPr>
+                </a:tc>
+                <a:tc>
+                  <a:txBody>
+                    <a:bodyPr/>
+                    <a:lstStyle/>
+                    <a:p>
+                      <a:pPr algn="just"/>
+                      <a:r>
+                        <a:rPr lang="en-PH" sz="1650" b="0" dirty="0">
+                          <a:solidFill>
+                            <a:schemeClr val="tx1"/>
+                          </a:solidFill>
+                        </a:rPr>
+                        <a:t>Limited escalation processes</a:t>
+                      </a:r>
+                    </a:p>
+                  </a:txBody>
+                  <a:tcPr anchor="ctr">
+                    <a:solidFill>
+                      <a:schemeClr val="accent2">
+                        <a:lumMod val="40000"/>
+                        <a:lumOff val="60000"/>
+                      </a:schemeClr>
+                    </a:solidFill>
+                  </a:tcPr>
+                </a:tc>
+                <a:tc>
+                  <a:txBody>
+                    <a:bodyPr/>
+                    <a:lstStyle/>
+                    <a:p>
+                      <a:pPr algn="just">
+                        <a:lnSpc>
+                          <a:spcPct val="100000"/>
+                        </a:lnSpc>
+                      </a:pPr>
+                      <a:r>
+                        <a:rPr lang="en-PH" sz="1650" b="0" dirty="0">
+                          <a:solidFill>
+                            <a:schemeClr val="tx1"/>
+                          </a:solidFill>
+                        </a:rPr>
+                        <a:t>The escalation management module can do the following: </a:t>
+                      </a:r>
+                    </a:p>
+                    <a:p>
+                      <a:pPr algn="just">
+                        <a:lnSpc>
+                          <a:spcPct val="100000"/>
+                        </a:lnSpc>
+                      </a:pPr>
+                      <a:endParaRPr lang="en-PH" sz="1650" b="0" dirty="0">
+                        <a:solidFill>
+                          <a:schemeClr val="tx1"/>
+                        </a:solidFill>
+                      </a:endParaRPr>
+                    </a:p>
+                    <a:p>
+                      <a:pPr marL="285750" indent="-285750" algn="just">
+                        <a:lnSpc>
+                          <a:spcPct val="100000"/>
+                        </a:lnSpc>
+                        <a:buFont typeface="Arial" panose="020B0604020202020204" pitchFamily="34" charset="0"/>
+                        <a:buChar char="•"/>
+                      </a:pPr>
+                      <a:r>
+                        <a:rPr lang="en-PH" sz="1650" b="0" dirty="0">
+                          <a:solidFill>
+                            <a:schemeClr val="tx1"/>
+                          </a:solidFill>
+                        </a:rPr>
+                        <a:t>Generates an escalation report that can be used by the executive management for decision making</a:t>
+                      </a:r>
+                    </a:p>
+                  </a:txBody>
+                  <a:tcPr anchor="ctr">
+                    <a:solidFill>
+                      <a:schemeClr val="accent2">
+                        <a:lumMod val="40000"/>
+                        <a:lumOff val="60000"/>
+                      </a:schemeClr>
+                    </a:solidFill>
+                  </a:tcPr>
+                </a:tc>
+                <a:extLst>
+                  <a:ext uri="{0D108BD9-81ED-4DB2-BD59-A6C34878D82A}">
+                    <a16:rowId xmlns:a16="http://schemas.microsoft.com/office/drawing/2014/main" val="1429810749"/>
+                  </a:ext>
+                </a:extLst>
+              </a:tr>
+            </a:tbl>
+          </a:graphicData>
+        </a:graphic>
+      </p:graphicFrame>
+      <p:graphicFrame>
+        <p:nvGraphicFramePr>
+          <p:cNvPr id="9" name="Content Placeholder 6">
+            <a:extLst>
+              <a:ext uri="{FF2B5EF4-FFF2-40B4-BE49-F238E27FC236}">
+                <a16:creationId xmlns:a16="http://schemas.microsoft.com/office/drawing/2014/main" id="{2828C76E-6487-4AAE-8984-053CCE765A8C}"/>
+              </a:ext>
+            </a:extLst>
+          </p:cNvPr>
+          <p:cNvGraphicFramePr>
+            <a:graphicFrameLocks/>
+          </p:cNvGraphicFramePr>
+          <p:nvPr>
+            <p:extLst>
+              <p:ext uri="{D42A27DB-BD31-4B8C-83A1-F6EECF244321}">
+                <p14:modId xmlns:p14="http://schemas.microsoft.com/office/powerpoint/2010/main" val="2881320764"/>
+              </p:ext>
+            </p:extLst>
+          </p:nvPr>
+        </p:nvGraphicFramePr>
+        <p:xfrm>
+          <a:off x="1274164" y="4358388"/>
+          <a:ext cx="9563724" cy="1600200"/>
+        </p:xfrm>
+        <a:graphic>
+          <a:graphicData uri="http://schemas.openxmlformats.org/drawingml/2006/table">
+            <a:tbl>
+              <a:tblPr firstRow="1" bandRow="1">
+                <a:tableStyleId>{5C22544A-7EE6-4342-B048-85BDC9FD1C3A}</a:tableStyleId>
+              </a:tblPr>
+              <a:tblGrid>
+                <a:gridCol w="2908092">
+                  <a:extLst>
+                    <a:ext uri="{9D8B030D-6E8A-4147-A177-3AD203B41FA5}">
+                      <a16:colId xmlns:a16="http://schemas.microsoft.com/office/drawing/2014/main" val="3570394154"/>
+                    </a:ext>
+                  </a:extLst>
+                </a:gridCol>
+                <a:gridCol w="3072983">
+                  <a:extLst>
+                    <a:ext uri="{9D8B030D-6E8A-4147-A177-3AD203B41FA5}">
+                      <a16:colId xmlns:a16="http://schemas.microsoft.com/office/drawing/2014/main" val="1430584674"/>
+                    </a:ext>
+                  </a:extLst>
+                </a:gridCol>
+                <a:gridCol w="3582649">
+                  <a:extLst>
+                    <a:ext uri="{9D8B030D-6E8A-4147-A177-3AD203B41FA5}">
+                      <a16:colId xmlns:a16="http://schemas.microsoft.com/office/drawing/2014/main" val="927683361"/>
+                    </a:ext>
+                  </a:extLst>
+                </a:gridCol>
+              </a:tblGrid>
+              <a:tr h="835702">
+                <a:tc>
+                  <a:txBody>
+                    <a:bodyPr/>
+                    <a:lstStyle/>
+                    <a:p>
+                      <a:pPr algn="ctr"/>
+                      <a:r>
+                        <a:rPr lang="en-PH" sz="1650" b="0" dirty="0">
+                          <a:solidFill>
+                            <a:schemeClr val="tx1"/>
+                          </a:solidFill>
+                        </a:rPr>
+                        <a:t>4. Ease of notification via hand-held devices</a:t>
+                      </a:r>
+                    </a:p>
+                  </a:txBody>
+                  <a:tcPr anchor="ctr">
+                    <a:solidFill>
+                      <a:schemeClr val="accent2">
+                        <a:lumMod val="40000"/>
+                        <a:lumOff val="60000"/>
+                      </a:schemeClr>
+                    </a:solidFill>
+                  </a:tcPr>
+                </a:tc>
+                <a:tc>
+                  <a:txBody>
+                    <a:bodyPr/>
+                    <a:lstStyle/>
+                    <a:p>
+                      <a:pPr algn="l"/>
+                      <a:r>
+                        <a:rPr lang="en-PH" sz="1650" b="0" dirty="0">
+                          <a:solidFill>
+                            <a:schemeClr val="tx1"/>
+                          </a:solidFill>
+                        </a:rPr>
+                        <a:t>Means of communication between employees: </a:t>
+                      </a:r>
+                    </a:p>
+                    <a:p>
+                      <a:pPr algn="l"/>
+                      <a:endParaRPr lang="en-PH" sz="1650" b="0" dirty="0">
+                        <a:solidFill>
+                          <a:schemeClr val="tx1"/>
+                        </a:solidFill>
+                      </a:endParaRPr>
+                    </a:p>
+                    <a:p>
+                      <a:pPr marL="360363" lvl="1" indent="-269875" algn="just">
+                        <a:buFont typeface="Arial" panose="020B0604020202020204" pitchFamily="34" charset="0"/>
+                        <a:buChar char="•"/>
+                      </a:pPr>
+                      <a:r>
+                        <a:rPr lang="en-PH" sz="1650" b="0" dirty="0">
+                          <a:solidFill>
+                            <a:schemeClr val="tx1"/>
+                          </a:solidFill>
+                        </a:rPr>
+                        <a:t>Walkie Talkie</a:t>
+                      </a:r>
+                    </a:p>
+                  </a:txBody>
+                  <a:tcPr anchor="ctr">
+                    <a:solidFill>
+                      <a:schemeClr val="accent2">
+                        <a:lumMod val="40000"/>
+                        <a:lumOff val="60000"/>
+                      </a:schemeClr>
+                    </a:solidFill>
+                  </a:tcPr>
+                </a:tc>
+                <a:tc>
+                  <a:txBody>
+                    <a:bodyPr/>
+                    <a:lstStyle/>
+                    <a:p>
+                      <a:pPr algn="just"/>
+                      <a:r>
+                        <a:rPr lang="en-PH" sz="1650" b="0" dirty="0">
+                          <a:solidFill>
+                            <a:schemeClr val="tx1"/>
+                          </a:solidFill>
+                        </a:rPr>
+                        <a:t>Escalation management module will be a mobile application</a:t>
+                      </a:r>
+                    </a:p>
+                    <a:p>
+                      <a:pPr algn="just"/>
+                      <a:endParaRPr lang="en-PH" sz="1650" b="0" dirty="0">
+                        <a:solidFill>
+                          <a:schemeClr val="tx1"/>
+                        </a:solidFill>
+                      </a:endParaRPr>
+                    </a:p>
+                    <a:p>
+                      <a:pPr algn="just"/>
+                      <a:r>
+                        <a:rPr lang="en-PH" sz="1650" b="0" dirty="0">
+                          <a:solidFill>
+                            <a:schemeClr val="tx1"/>
+                          </a:solidFill>
+                        </a:rPr>
+                        <a:t>Assigned employee on the hierarchy level of the module will be notified regarding the escalated service tickets</a:t>
+                      </a:r>
+                    </a:p>
+                  </a:txBody>
+                  <a:tcPr anchor="ctr">
+                    <a:solidFill>
+                      <a:schemeClr val="accent2">
+                        <a:lumMod val="40000"/>
+                        <a:lumOff val="60000"/>
+                      </a:schemeClr>
+                    </a:solidFill>
+                  </a:tcPr>
+                </a:tc>
+                <a:extLst>
+                  <a:ext uri="{0D108BD9-81ED-4DB2-BD59-A6C34878D82A}">
+                    <a16:rowId xmlns:a16="http://schemas.microsoft.com/office/drawing/2014/main" val="1429810749"/>
+                  </a:ext>
+                </a:extLst>
+              </a:tr>
+            </a:tbl>
+          </a:graphicData>
+        </a:graphic>
+      </p:graphicFrame>
+    </p:spTree>
+    <p:extLst>
+      <p:ext uri="{BB962C8B-B14F-4D97-AF65-F5344CB8AC3E}">
+        <p14:creationId xmlns:p14="http://schemas.microsoft.com/office/powerpoint/2010/main" val="2439656413"/>
+      </p:ext>
+    </p:extLst>
+  </p:cSld>
+  <p:clrMapOvr>
+    <a:masterClrMapping/>
+  </p:clrMapOvr>
+  <p:timing>
+    <p:tnLst>
+      <p:par>
+        <p:cTn id="1" dur="indefinite" restart="never" nodeType="tmRoot">
+          <p:childTnLst>
+            <p:seq concurrent="1" nextAc="seek">
+              <p:cTn id="2" dur="indefinite" nodeType="mainSeq">
+                <p:childTnLst>
+                  <p:par>
+                    <p:cTn id="3" fill="hold">
+                      <p:stCondLst>
+                        <p:cond delay="indefinite"/>
+                      </p:stCondLst>
+                      <p:childTnLst>
+                        <p:par>
+                          <p:cTn id="4" fill="hold">
+                            <p:stCondLst>
+                              <p:cond delay="0"/>
+                            </p:stCondLst>
+                            <p:childTnLst>
+                              <p:par>
+                                <p:cTn id="5" presetID="10" presetClass="entr" presetSubtype="0" fill="hold" nodeType="clickEffect">
+                                  <p:stCondLst>
+                                    <p:cond delay="0"/>
+                                  </p:stCondLst>
+                                  <p:childTnLst>
+                                    <p:set>
+                                      <p:cBhvr>
+                                        <p:cTn id="6" dur="1" fill="hold">
+                                          <p:stCondLst>
+                                            <p:cond delay="0"/>
+                                          </p:stCondLst>
+                                        </p:cTn>
+                                        <p:tgtEl>
+                                          <p:spTgt spid="7"/>
+                                        </p:tgtEl>
+                                        <p:attrNameLst>
+                                          <p:attrName>style.visibility</p:attrName>
+                                        </p:attrNameLst>
+                                      </p:cBhvr>
+                                      <p:to>
+                                        <p:strVal val="visible"/>
+                                      </p:to>
+                                    </p:set>
+                                    <p:animEffect transition="in" filter="fade">
+                                      <p:cBhvr>
+                                        <p:cTn id="7" dur="500"/>
+                                        <p:tgtEl>
+                                          <p:spTgt spid="7"/>
+                                        </p:tgtEl>
+                                      </p:cBhvr>
+                                    </p:animEffect>
+                                  </p:childTnLst>
+                                </p:cTn>
+                              </p:par>
+                            </p:childTnLst>
+                          </p:cTn>
+                        </p:par>
+                      </p:childTnLst>
+                    </p:cTn>
+                  </p:par>
+                  <p:par>
+                    <p:cTn id="8" fill="hold">
+                      <p:stCondLst>
+                        <p:cond delay="indefinite"/>
+                      </p:stCondLst>
+                      <p:childTnLst>
+                        <p:par>
+                          <p:cTn id="9" fill="hold">
+                            <p:stCondLst>
+                              <p:cond delay="0"/>
+                            </p:stCondLst>
+                            <p:childTnLst>
+                              <p:par>
+                                <p:cTn id="10" presetID="10" presetClass="entr" presetSubtype="0" fill="hold" nodeType="clickEffect">
+                                  <p:stCondLst>
+                                    <p:cond delay="0"/>
+                                  </p:stCondLst>
+                                  <p:childTnLst>
+                                    <p:set>
+                                      <p:cBhvr>
+                                        <p:cTn id="11" dur="1" fill="hold">
+                                          <p:stCondLst>
+                                            <p:cond delay="0"/>
+                                          </p:stCondLst>
+                                        </p:cTn>
+                                        <p:tgtEl>
+                                          <p:spTgt spid="8"/>
+                                        </p:tgtEl>
+                                        <p:attrNameLst>
+                                          <p:attrName>style.visibility</p:attrName>
+                                        </p:attrNameLst>
+                                      </p:cBhvr>
+                                      <p:to>
+                                        <p:strVal val="visible"/>
+                                      </p:to>
+                                    </p:set>
+                                    <p:animEffect transition="in" filter="fade">
+                                      <p:cBhvr>
+                                        <p:cTn id="12" dur="500"/>
+                                        <p:tgtEl>
+                                          <p:spTgt spid="8"/>
+                                        </p:tgtEl>
+                                      </p:cBhvr>
+                                    </p:animEffect>
+                                  </p:childTnLst>
+                                </p:cTn>
+                              </p:par>
+                            </p:childTnLst>
+                          </p:cTn>
+                        </p:par>
+                      </p:childTnLst>
+                    </p:cTn>
+                  </p:par>
+                  <p:par>
+                    <p:cTn id="13" fill="hold">
+                      <p:stCondLst>
+                        <p:cond delay="indefinite"/>
+                      </p:stCondLst>
+                      <p:childTnLst>
+                        <p:par>
+                          <p:cTn id="14" fill="hold">
+                            <p:stCondLst>
+                              <p:cond delay="0"/>
+                            </p:stCondLst>
+                            <p:childTnLst>
+                              <p:par>
+                                <p:cTn id="15" presetID="10" presetClass="entr" presetSubtype="0" fill="hold" nodeType="clickEffect">
+                                  <p:stCondLst>
+                                    <p:cond delay="0"/>
+                                  </p:stCondLst>
+                                  <p:childTnLst>
+                                    <p:set>
+                                      <p:cBhvr>
+                                        <p:cTn id="16" dur="1" fill="hold">
+                                          <p:stCondLst>
+                                            <p:cond delay="0"/>
+                                          </p:stCondLst>
+                                        </p:cTn>
+                                        <p:tgtEl>
+                                          <p:spTgt spid="9"/>
+                                        </p:tgtEl>
+                                        <p:attrNameLst>
+                                          <p:attrName>style.visibility</p:attrName>
+                                        </p:attrNameLst>
+                                      </p:cBhvr>
+                                      <p:to>
+                                        <p:strVal val="visible"/>
+                                      </p:to>
+                                    </p:set>
+                                    <p:animEffect transition="in" filter="fade">
+                                      <p:cBhvr>
+                                        <p:cTn id="17" dur="500"/>
+                                        <p:tgtEl>
+                                          <p:spTgt spid="9"/>
+                                        </p:tgtEl>
+                                      </p:cBhvr>
+                                    </p:animEffect>
+                                  </p:childTnLst>
+                                </p:cTn>
+                              </p:par>
+                            </p:childTnLst>
+                          </p:cTn>
+                        </p:par>
+                      </p:childTnLst>
+                    </p:cTn>
+                  </p:par>
+                </p:childTnLst>
+              </p:cTn>
+              <p:prevCondLst>
+                <p:cond evt="onPrev" delay="0">
+                  <p:tgtEl>
+                    <p:sldTgt/>
+                  </p:tgtEl>
+                </p:cond>
+              </p:prevCondLst>
+              <p:nextCondLst>
+                <p:cond evt="onNext" delay="0">
+                  <p:tgtEl>
+                    <p:sldTgt/>
+                  </p:tgtEl>
+                </p:cond>
+              </p:nextCondLst>
+            </p:seq>
+          </p:childTnLst>
+        </p:cTn>
+      </p:par>
+    </p:tnLst>
+  </p:timing>
+</p:sld>
+</file>
+
+<file path=ppt/slides/slide13.xml><?xml version="1.0" encoding="utf-8"?>
+<p:sld xmlns:a="http://schemas.openxmlformats.org/drawingml/2006/main" xmlns:r="http://schemas.openxmlformats.org/officeDocument/2006/relationships" xmlns:p="http://schemas.openxmlformats.org/presentationml/2006/main" show="0">
+  <p:cSld>
+    <p:spTree>
+      <p:nvGrpSpPr>
+        <p:cNvPr id="1" name=""/>
+        <p:cNvGrpSpPr/>
+        <p:nvPr/>
+      </p:nvGrpSpPr>
+      <p:grpSpPr>
+        <a:xfrm>
+          <a:off x="0" y="0"/>
+          <a:ext cx="0" cy="0"/>
+          <a:chOff x="0" y="0"/>
+          <a:chExt cx="0" cy="0"/>
+        </a:xfrm>
+      </p:grpSpPr>
+      <p:sp>
+        <p:nvSpPr>
+          <p:cNvPr id="2" name="Title 1">
+            <a:extLst>
+              <a:ext uri="{FF2B5EF4-FFF2-40B4-BE49-F238E27FC236}">
+                <a16:creationId xmlns:a16="http://schemas.microsoft.com/office/drawing/2014/main" id="{0BB624B8-9446-4B1F-9938-A41C9A647B6A}"/>
+              </a:ext>
+            </a:extLst>
+          </p:cNvPr>
+          <p:cNvSpPr>
+            <a:spLocks noGrp="1"/>
+          </p:cNvSpPr>
+          <p:nvPr>
+            <p:ph type="title"/>
+          </p:nvPr>
+        </p:nvSpPr>
+        <p:spPr>
+          <a:xfrm>
+            <a:off x="2231135" y="578930"/>
+            <a:ext cx="7729728" cy="1188720"/>
+          </a:xfrm>
+        </p:spPr>
+        <p:txBody>
+          <a:bodyPr/>
+          <a:lstStyle/>
+          <a:p>
+            <a:r>
+              <a:rPr lang="en-PH" dirty="0"/>
+              <a:t>GAP ANALYSIS</a:t>
+            </a:r>
+          </a:p>
+        </p:txBody>
+      </p:sp>
+      <p:pic>
+        <p:nvPicPr>
           <p:cNvPr id="4" name="Content Placeholder 3">
             <a:extLst>
               <a:ext uri="{FF2B5EF4-FFF2-40B4-BE49-F238E27FC236}">
@@ -9026,10 +10738,40 @@
           </a:prstGeom>
         </p:spPr>
       </p:pic>
+      <p:pic>
+        <p:nvPicPr>
+          <p:cNvPr id="5" name="Picture 4">
+            <a:extLst>
+              <a:ext uri="{FF2B5EF4-FFF2-40B4-BE49-F238E27FC236}">
+                <a16:creationId xmlns:a16="http://schemas.microsoft.com/office/drawing/2014/main" id="{E53BF160-80D1-47C5-A2B9-F7DF1E9A5E19}"/>
+              </a:ext>
+            </a:extLst>
+          </p:cNvPr>
+          <p:cNvPicPr>
+            <a:picLocks noChangeAspect="1"/>
+          </p:cNvPicPr>
+          <p:nvPr/>
+        </p:nvPicPr>
+        <p:blipFill>
+          <a:blip r:embed="rId4"/>
+          <a:stretch>
+            <a:fillRect/>
+          </a:stretch>
+        </p:blipFill>
+        <p:spPr>
+          <a:xfrm>
+            <a:off x="11182662" y="5848662"/>
+            <a:ext cx="1009338" cy="1009338"/>
+          </a:xfrm>
+          <a:prstGeom prst="rect">
+            <a:avLst/>
+          </a:prstGeom>
+        </p:spPr>
+      </p:pic>
     </p:spTree>
     <p:extLst>
       <p:ext uri="{BB962C8B-B14F-4D97-AF65-F5344CB8AC3E}">
-        <p14:creationId xmlns:p14="http://schemas.microsoft.com/office/powerpoint/2010/main" val="2086066669"/>
+        <p14:creationId xmlns:p14="http://schemas.microsoft.com/office/powerpoint/2010/main" val="1945109329"/>
       </p:ext>
     </p:extLst>
   </p:cSld>
@@ -9039,7 +10781,7 @@
 </p:sld>
 </file>
 
-<file path=ppt/slides/slide12.xml><?xml version="1.0" encoding="utf-8"?>
+<file path=ppt/slides/slide14.xml><?xml version="1.0" encoding="utf-8"?>
 <p:sld xmlns:a="http://schemas.openxmlformats.org/drawingml/2006/main" xmlns:r="http://schemas.openxmlformats.org/officeDocument/2006/relationships" xmlns:p="http://schemas.openxmlformats.org/presentationml/2006/main">
   <p:cSld>
     <p:spTree>
@@ -9163,10 +10905,10 @@
       </p:sp>
       <p:pic>
         <p:nvPicPr>
-          <p:cNvPr id="5" name="Picture 4">
+          <p:cNvPr id="6" name="Picture 5">
             <a:extLst>
               <a:ext uri="{FF2B5EF4-FFF2-40B4-BE49-F238E27FC236}">
-                <a16:creationId xmlns:a16="http://schemas.microsoft.com/office/drawing/2014/main" id="{9BADE763-5A97-414C-BB90-360E8DACE4B3}"/>
+                <a16:creationId xmlns:a16="http://schemas.microsoft.com/office/drawing/2014/main" id="{5E66341B-1F46-4DAB-99F9-C9208AEAFFC1}"/>
               </a:ext>
             </a:extLst>
           </p:cNvPr>
@@ -9175,15 +10917,16 @@
           </p:cNvPicPr>
           <p:nvPr/>
         </p:nvPicPr>
-        <p:blipFill rotWithShape="1">
+        <p:blipFill>
           <a:blip r:embed="rId3"/>
-          <a:srcRect l="7895" t="17262" r="10836"/>
-          <a:stretch/>
+          <a:stretch>
+            <a:fillRect/>
+          </a:stretch>
         </p:blipFill>
         <p:spPr>
           <a:xfrm>
-            <a:off x="10158412" y="6104864"/>
-            <a:ext cx="2033587" cy="753136"/>
+            <a:off x="11182662" y="5848662"/>
+            <a:ext cx="1009338" cy="1009338"/>
           </a:xfrm>
           <a:prstGeom prst="rect">
             <a:avLst/>
@@ -9419,7 +11162,7 @@
 </p:sld>
 </file>
 
-<file path=ppt/slides/slide13.xml><?xml version="1.0" encoding="utf-8"?>
+<file path=ppt/slides/slide15.xml><?xml version="1.0" encoding="utf-8"?>
 <p:sld xmlns:a="http://schemas.openxmlformats.org/drawingml/2006/main" xmlns:r="http://schemas.openxmlformats.org/officeDocument/2006/relationships" xmlns:p="http://schemas.openxmlformats.org/presentationml/2006/main">
   <p:cSld>
     <p:spTree>
@@ -9552,10 +11295,10 @@
       </p:sp>
       <p:pic>
         <p:nvPicPr>
-          <p:cNvPr id="6" name="Picture 5">
+          <p:cNvPr id="5" name="Picture 4">
             <a:extLst>
               <a:ext uri="{FF2B5EF4-FFF2-40B4-BE49-F238E27FC236}">
-                <a16:creationId xmlns:a16="http://schemas.microsoft.com/office/drawing/2014/main" id="{80FB4E16-A6DC-4C01-B968-1FF9A48AA32D}"/>
+                <a16:creationId xmlns:a16="http://schemas.microsoft.com/office/drawing/2014/main" id="{527D18EA-D7CE-422A-A3FA-7799298B9304}"/>
               </a:ext>
             </a:extLst>
           </p:cNvPr>
@@ -9564,15 +11307,16 @@
           </p:cNvPicPr>
           <p:nvPr/>
         </p:nvPicPr>
-        <p:blipFill rotWithShape="1">
+        <p:blipFill>
           <a:blip r:embed="rId3"/>
-          <a:srcRect l="7895" t="17262" r="10836"/>
-          <a:stretch/>
+          <a:stretch>
+            <a:fillRect/>
+          </a:stretch>
         </p:blipFill>
         <p:spPr>
           <a:xfrm>
-            <a:off x="10158412" y="6104864"/>
-            <a:ext cx="2033587" cy="753136"/>
+            <a:off x="11182662" y="5848662"/>
+            <a:ext cx="1009338" cy="1009338"/>
           </a:xfrm>
           <a:prstGeom prst="rect">
             <a:avLst/>
@@ -9955,7 +11699,7 @@
 </p:sld>
 </file>
 
-<file path=ppt/slides/slide14.xml><?xml version="1.0" encoding="utf-8"?>
+<file path=ppt/slides/slide16.xml><?xml version="1.0" encoding="utf-8"?>
 <p:sld xmlns:a="http://schemas.openxmlformats.org/drawingml/2006/main" xmlns:r="http://schemas.openxmlformats.org/officeDocument/2006/relationships" xmlns:p="http://schemas.openxmlformats.org/presentationml/2006/main">
   <p:cSld>
     <p:spTree>
@@ -10036,10 +11780,10 @@
       </p:pic>
       <p:pic>
         <p:nvPicPr>
-          <p:cNvPr id="7" name="Picture 6">
+          <p:cNvPr id="6" name="Picture 5">
             <a:extLst>
               <a:ext uri="{FF2B5EF4-FFF2-40B4-BE49-F238E27FC236}">
-                <a16:creationId xmlns:a16="http://schemas.microsoft.com/office/drawing/2014/main" id="{F1F5F346-DB04-4FAF-9331-90F804265F33}"/>
+                <a16:creationId xmlns:a16="http://schemas.microsoft.com/office/drawing/2014/main" id="{C241D680-7E57-4837-B6BE-2CDB5550CE70}"/>
               </a:ext>
             </a:extLst>
           </p:cNvPr>
@@ -10048,15 +11792,16 @@
           </p:cNvPicPr>
           <p:nvPr/>
         </p:nvPicPr>
-        <p:blipFill rotWithShape="1">
+        <p:blipFill>
           <a:blip r:embed="rId4"/>
-          <a:srcRect l="7895" t="17262" r="10836"/>
-          <a:stretch/>
+          <a:stretch>
+            <a:fillRect/>
+          </a:stretch>
         </p:blipFill>
         <p:spPr>
           <a:xfrm>
-            <a:off x="10158412" y="6104864"/>
-            <a:ext cx="2033587" cy="753136"/>
+            <a:off x="11182662" y="5848662"/>
+            <a:ext cx="1009338" cy="1009338"/>
           </a:xfrm>
           <a:prstGeom prst="rect">
             <a:avLst/>
@@ -10159,7 +11904,7 @@
 </p:sld>
 </file>
 
-<file path=ppt/slides/slide15.xml><?xml version="1.0" encoding="utf-8"?>
+<file path=ppt/slides/slide17.xml><?xml version="1.0" encoding="utf-8"?>
 <p:sld xmlns:a="http://schemas.openxmlformats.org/drawingml/2006/main" xmlns:r="http://schemas.openxmlformats.org/officeDocument/2006/relationships" xmlns:p="http://schemas.openxmlformats.org/presentationml/2006/main">
   <p:cSld>
     <p:spTree>
@@ -10240,10 +11985,10 @@
       </p:pic>
       <p:pic>
         <p:nvPicPr>
-          <p:cNvPr id="7" name="Picture 6">
+          <p:cNvPr id="6" name="Picture 5">
             <a:extLst>
               <a:ext uri="{FF2B5EF4-FFF2-40B4-BE49-F238E27FC236}">
-                <a16:creationId xmlns:a16="http://schemas.microsoft.com/office/drawing/2014/main" id="{C19E7537-2A44-47F0-A507-B4CFA6574CB0}"/>
+                <a16:creationId xmlns:a16="http://schemas.microsoft.com/office/drawing/2014/main" id="{40CC84CE-4C5B-40A6-A784-A832A2576C72}"/>
               </a:ext>
             </a:extLst>
           </p:cNvPr>
@@ -10252,15 +11997,16 @@
           </p:cNvPicPr>
           <p:nvPr/>
         </p:nvPicPr>
-        <p:blipFill rotWithShape="1">
+        <p:blipFill>
           <a:blip r:embed="rId4"/>
-          <a:srcRect l="7895" t="17262" r="10836"/>
-          <a:stretch/>
+          <a:stretch>
+            <a:fillRect/>
+          </a:stretch>
         </p:blipFill>
         <p:spPr>
           <a:xfrm>
-            <a:off x="10158412" y="6104864"/>
-            <a:ext cx="2033587" cy="753136"/>
+            <a:off x="11182662" y="5848662"/>
+            <a:ext cx="1009338" cy="1009338"/>
           </a:xfrm>
           <a:prstGeom prst="rect">
             <a:avLst/>
@@ -10551,15 +12297,16 @@
           </p:cNvPicPr>
           <p:nvPr/>
         </p:nvPicPr>
-        <p:blipFill rotWithShape="1">
+        <p:blipFill>
           <a:blip r:embed="rId3"/>
-          <a:srcRect l="7895" t="17262" r="10836"/>
-          <a:stretch/>
+          <a:stretch>
+            <a:fillRect/>
+          </a:stretch>
         </p:blipFill>
         <p:spPr>
           <a:xfrm>
-            <a:off x="10158412" y="6104864"/>
-            <a:ext cx="2033587" cy="753136"/>
+            <a:off x="11182662" y="5848662"/>
+            <a:ext cx="1009338" cy="1009338"/>
           </a:xfrm>
           <a:prstGeom prst="rect">
             <a:avLst/>
@@ -11124,10 +12871,10 @@
       </p:sp>
       <p:pic>
         <p:nvPicPr>
-          <p:cNvPr id="5" name="Picture 4">
+          <p:cNvPr id="6" name="Picture 5">
             <a:extLst>
               <a:ext uri="{FF2B5EF4-FFF2-40B4-BE49-F238E27FC236}">
-                <a16:creationId xmlns:a16="http://schemas.microsoft.com/office/drawing/2014/main" id="{7FA443F3-6BDF-4AC8-BCEA-9236B4B883E8}"/>
+                <a16:creationId xmlns:a16="http://schemas.microsoft.com/office/drawing/2014/main" id="{D716F1A5-71FC-4FDD-867F-2824C9E16A4C}"/>
               </a:ext>
             </a:extLst>
           </p:cNvPr>
@@ -11136,15 +12883,16 @@
           </p:cNvPicPr>
           <p:nvPr/>
         </p:nvPicPr>
-        <p:blipFill rotWithShape="1">
+        <p:blipFill>
           <a:blip r:embed="rId3"/>
-          <a:srcRect l="7895" t="17262" r="10836"/>
-          <a:stretch/>
+          <a:stretch>
+            <a:fillRect/>
+          </a:stretch>
         </p:blipFill>
         <p:spPr>
           <a:xfrm>
-            <a:off x="10158412" y="6104864"/>
-            <a:ext cx="2033587" cy="753136"/>
+            <a:off x="11182662" y="5848662"/>
+            <a:ext cx="1009338" cy="1009338"/>
           </a:xfrm>
           <a:prstGeom prst="rect">
             <a:avLst/>
@@ -11623,10 +13371,10 @@
       </p:sp>
       <p:pic>
         <p:nvPicPr>
-          <p:cNvPr id="5" name="Picture 4">
+          <p:cNvPr id="6" name="Picture 5">
             <a:extLst>
               <a:ext uri="{FF2B5EF4-FFF2-40B4-BE49-F238E27FC236}">
-                <a16:creationId xmlns:a16="http://schemas.microsoft.com/office/drawing/2014/main" id="{04DE35EF-31E0-49AA-81A2-2A104B6CD5DF}"/>
+                <a16:creationId xmlns:a16="http://schemas.microsoft.com/office/drawing/2014/main" id="{9A7F987D-5493-4A4A-B2EE-6F7FFD9DD084}"/>
               </a:ext>
             </a:extLst>
           </p:cNvPr>
@@ -11635,15 +13383,16 @@
           </p:cNvPicPr>
           <p:nvPr/>
         </p:nvPicPr>
-        <p:blipFill rotWithShape="1">
+        <p:blipFill>
           <a:blip r:embed="rId3"/>
-          <a:srcRect l="7895" t="17262" r="10836"/>
-          <a:stretch/>
+          <a:stretch>
+            <a:fillRect/>
+          </a:stretch>
         </p:blipFill>
         <p:spPr>
           <a:xfrm>
-            <a:off x="10158412" y="6104864"/>
-            <a:ext cx="2033587" cy="753136"/>
+            <a:off x="11182662" y="5848662"/>
+            <a:ext cx="1009338" cy="1009338"/>
           </a:xfrm>
           <a:prstGeom prst="rect">
             <a:avLst/>
@@ -11866,10 +13615,10 @@
       </p:sp>
       <p:pic>
         <p:nvPicPr>
-          <p:cNvPr id="5" name="Picture 4">
+          <p:cNvPr id="6" name="Picture 5">
             <a:extLst>
               <a:ext uri="{FF2B5EF4-FFF2-40B4-BE49-F238E27FC236}">
-                <a16:creationId xmlns:a16="http://schemas.microsoft.com/office/drawing/2014/main" id="{478FF048-5619-4B03-AD81-4A7EA2D59592}"/>
+                <a16:creationId xmlns:a16="http://schemas.microsoft.com/office/drawing/2014/main" id="{748AC9A6-E053-4456-AEE7-7D8558092EAE}"/>
               </a:ext>
             </a:extLst>
           </p:cNvPr>
@@ -11878,15 +13627,16 @@
           </p:cNvPicPr>
           <p:nvPr/>
         </p:nvPicPr>
-        <p:blipFill rotWithShape="1">
+        <p:blipFill>
           <a:blip r:embed="rId3"/>
-          <a:srcRect l="7895" t="17262" r="10836"/>
-          <a:stretch/>
+          <a:stretch>
+            <a:fillRect/>
+          </a:stretch>
         </p:blipFill>
         <p:spPr>
           <a:xfrm>
-            <a:off x="10158412" y="6104864"/>
-            <a:ext cx="2033587" cy="753136"/>
+            <a:off x="11182662" y="5848662"/>
+            <a:ext cx="1009338" cy="1009338"/>
           </a:xfrm>
           <a:prstGeom prst="rect">
             <a:avLst/>
@@ -12227,10 +13977,10 @@
       </p:sp>
       <p:pic>
         <p:nvPicPr>
-          <p:cNvPr id="5" name="Picture 4">
+          <p:cNvPr id="6" name="Picture 5">
             <a:extLst>
               <a:ext uri="{FF2B5EF4-FFF2-40B4-BE49-F238E27FC236}">
-                <a16:creationId xmlns:a16="http://schemas.microsoft.com/office/drawing/2014/main" id="{8C0F9917-B388-498F-B42E-ECD576388332}"/>
+                <a16:creationId xmlns:a16="http://schemas.microsoft.com/office/drawing/2014/main" id="{D343E34E-1098-4790-BEEE-CDA91F8CE82E}"/>
               </a:ext>
             </a:extLst>
           </p:cNvPr>
@@ -12239,15 +13989,16 @@
           </p:cNvPicPr>
           <p:nvPr/>
         </p:nvPicPr>
-        <p:blipFill rotWithShape="1">
+        <p:blipFill>
           <a:blip r:embed="rId3"/>
-          <a:srcRect l="7895" t="17262" r="10836"/>
-          <a:stretch/>
+          <a:stretch>
+            <a:fillRect/>
+          </a:stretch>
         </p:blipFill>
         <p:spPr>
           <a:xfrm>
-            <a:off x="10158412" y="6104864"/>
-            <a:ext cx="2033587" cy="753136"/>
+            <a:off x="11182662" y="5848662"/>
+            <a:ext cx="1009338" cy="1009338"/>
           </a:xfrm>
           <a:prstGeom prst="rect">
             <a:avLst/>
@@ -12682,6 +14433,36 @@
           </a:p>
         </p:txBody>
       </p:sp>
+      <p:pic>
+        <p:nvPicPr>
+          <p:cNvPr id="10" name="Picture 9">
+            <a:extLst>
+              <a:ext uri="{FF2B5EF4-FFF2-40B4-BE49-F238E27FC236}">
+                <a16:creationId xmlns:a16="http://schemas.microsoft.com/office/drawing/2014/main" id="{82A47AF3-8F29-4C16-BFCF-5AC309118F12}"/>
+              </a:ext>
+            </a:extLst>
+          </p:cNvPr>
+          <p:cNvPicPr>
+            <a:picLocks noChangeAspect="1"/>
+          </p:cNvPicPr>
+          <p:nvPr/>
+        </p:nvPicPr>
+        <p:blipFill>
+          <a:blip r:embed="rId8"/>
+          <a:stretch>
+            <a:fillRect/>
+          </a:stretch>
+        </p:blipFill>
+        <p:spPr>
+          <a:xfrm>
+            <a:off x="11182662" y="5848662"/>
+            <a:ext cx="1009338" cy="1009338"/>
+          </a:xfrm>
+          <a:prstGeom prst="rect">
+            <a:avLst/>
+          </a:prstGeom>
+        </p:spPr>
+      </p:pic>
     </p:spTree>
     <p:extLst>
       <p:ext uri="{BB962C8B-B14F-4D97-AF65-F5344CB8AC3E}">
@@ -13039,10 +14820,10 @@
       </p:sp>
       <p:pic>
         <p:nvPicPr>
-          <p:cNvPr id="5" name="Picture 4">
+          <p:cNvPr id="6" name="Picture 5">
             <a:extLst>
               <a:ext uri="{FF2B5EF4-FFF2-40B4-BE49-F238E27FC236}">
-                <a16:creationId xmlns:a16="http://schemas.microsoft.com/office/drawing/2014/main" id="{7CD3FBC7-403B-4FAF-BACB-5738C745AE7C}"/>
+                <a16:creationId xmlns:a16="http://schemas.microsoft.com/office/drawing/2014/main" id="{CBE14BB4-C7A5-47C8-A1FE-E9A01A049BB6}"/>
               </a:ext>
             </a:extLst>
           </p:cNvPr>
@@ -13051,15 +14832,16 @@
           </p:cNvPicPr>
           <p:nvPr/>
         </p:nvPicPr>
-        <p:blipFill rotWithShape="1">
+        <p:blipFill>
           <a:blip r:embed="rId3"/>
-          <a:srcRect l="7895" t="17262" r="10836"/>
-          <a:stretch/>
+          <a:stretch>
+            <a:fillRect/>
+          </a:stretch>
         </p:blipFill>
         <p:spPr>
           <a:xfrm>
-            <a:off x="10158412" y="6104864"/>
-            <a:ext cx="2033587" cy="753136"/>
+            <a:off x="11182662" y="5848662"/>
+            <a:ext cx="1009338" cy="1009338"/>
           </a:xfrm>
           <a:prstGeom prst="rect">
             <a:avLst/>
@@ -14138,6 +15920,36 @@
           </a:graphicData>
         </a:graphic>
       </p:graphicFrame>
+      <p:pic>
+        <p:nvPicPr>
+          <p:cNvPr id="10" name="Picture 9">
+            <a:extLst>
+              <a:ext uri="{FF2B5EF4-FFF2-40B4-BE49-F238E27FC236}">
+                <a16:creationId xmlns:a16="http://schemas.microsoft.com/office/drawing/2014/main" id="{D03CF97F-245C-44A6-B6E2-465E34537263}"/>
+              </a:ext>
+            </a:extLst>
+          </p:cNvPr>
+          <p:cNvPicPr>
+            <a:picLocks noChangeAspect="1"/>
+          </p:cNvPicPr>
+          <p:nvPr/>
+        </p:nvPicPr>
+        <p:blipFill>
+          <a:blip r:embed="rId3"/>
+          <a:stretch>
+            <a:fillRect/>
+          </a:stretch>
+        </p:blipFill>
+        <p:spPr>
+          <a:xfrm>
+            <a:off x="11182662" y="5848662"/>
+            <a:ext cx="1009338" cy="1009338"/>
+          </a:xfrm>
+          <a:prstGeom prst="rect">
+            <a:avLst/>
+          </a:prstGeom>
+        </p:spPr>
+      </p:pic>
     </p:spTree>
     <p:extLst>
       <p:ext uri="{BB962C8B-B14F-4D97-AF65-F5344CB8AC3E}">

</xml_diff>